<commit_message>
Expanded the Classes section
</commit_message>
<xml_diff>
--- a/PowerShell Power-Up/PowerShell Power-Up.pptx
+++ b/PowerShell Power-Up/PowerShell Power-Up.pptx
@@ -9,24 +9,28 @@
     <p:sldId id="260" r:id="rId5"/>
     <p:sldId id="258" r:id="rId6"/>
     <p:sldId id="257" r:id="rId7"/>
-    <p:sldId id="264" r:id="rId8"/>
-    <p:sldId id="259" r:id="rId9"/>
-    <p:sldId id="266" r:id="rId10"/>
-    <p:sldId id="265" r:id="rId11"/>
-    <p:sldId id="267" r:id="rId12"/>
-    <p:sldId id="268" r:id="rId13"/>
-    <p:sldId id="269" r:id="rId14"/>
-    <p:sldId id="270" r:id="rId15"/>
-    <p:sldId id="271" r:id="rId16"/>
-    <p:sldId id="272" r:id="rId17"/>
-    <p:sldId id="273" r:id="rId18"/>
-    <p:sldId id="274" r:id="rId19"/>
-    <p:sldId id="275" r:id="rId20"/>
-    <p:sldId id="276" r:id="rId21"/>
-    <p:sldId id="277" r:id="rId22"/>
-    <p:sldId id="262" r:id="rId23"/>
-    <p:sldId id="263" r:id="rId24"/>
-    <p:sldId id="261" r:id="rId25"/>
+    <p:sldId id="281" r:id="rId8"/>
+    <p:sldId id="264" r:id="rId9"/>
+    <p:sldId id="280" r:id="rId10"/>
+    <p:sldId id="278" r:id="rId11"/>
+    <p:sldId id="279" r:id="rId12"/>
+    <p:sldId id="259" r:id="rId13"/>
+    <p:sldId id="266" r:id="rId14"/>
+    <p:sldId id="265" r:id="rId15"/>
+    <p:sldId id="267" r:id="rId16"/>
+    <p:sldId id="268" r:id="rId17"/>
+    <p:sldId id="269" r:id="rId18"/>
+    <p:sldId id="270" r:id="rId19"/>
+    <p:sldId id="271" r:id="rId20"/>
+    <p:sldId id="272" r:id="rId21"/>
+    <p:sldId id="273" r:id="rId22"/>
+    <p:sldId id="274" r:id="rId23"/>
+    <p:sldId id="275" r:id="rId24"/>
+    <p:sldId id="276" r:id="rId25"/>
+    <p:sldId id="277" r:id="rId26"/>
+    <p:sldId id="262" r:id="rId27"/>
+    <p:sldId id="263" r:id="rId28"/>
+    <p:sldId id="261" r:id="rId29"/>
   </p:sldIdLst>
   <p:sldSz cx="12192000" cy="6858000"/>
   <p:notesSz cx="6858000" cy="9144000"/>
@@ -136,7 +140,7 @@
 <file path=ppt/revisionInfo.xml><?xml version="1.0" encoding="utf-8"?>
 <p1510:revInfo xmlns:a="http://schemas.openxmlformats.org/drawingml/2006/main" xmlns:r="http://schemas.openxmlformats.org/officeDocument/2006/relationships" xmlns:p1510="http://schemas.microsoft.com/office/powerpoint/2015/10/main">
   <p1510:revLst>
-    <p1510:client id="{91896460-D138-4A24-9634-D43292B2F23F}" v="2239" dt="2023-03-18T17:25:44.217"/>
+    <p1510:client id="{E3C3522B-5466-4779-B97D-3D5A961C1C8F}" v="4" dt="2023-03-31T05:30:34.275"/>
   </p1510:revLst>
 </p1510:revInfo>
 </file>
@@ -796,6 +800,143 @@
       </pc:sldChg>
     </pc:docChg>
   </pc:docChgLst>
+  <pc:docChgLst>
+    <pc:chgData name="Nathan Ziehnert" userId="181e87c2-d4ba-4c56-bf65-81cef205a649" providerId="ADAL" clId="{E3C3522B-5466-4779-B97D-3D5A961C1C8F}"/>
+    <pc:docChg chg="undo redo custSel addSld modSld">
+      <pc:chgData name="Nathan Ziehnert" userId="181e87c2-d4ba-4c56-bf65-81cef205a649" providerId="ADAL" clId="{E3C3522B-5466-4779-B97D-3D5A961C1C8F}" dt="2023-03-31T05:31:37.040" v="3141" actId="20577"/>
+      <pc:docMkLst>
+        <pc:docMk/>
+      </pc:docMkLst>
+      <pc:sldChg chg="modSp mod">
+        <pc:chgData name="Nathan Ziehnert" userId="181e87c2-d4ba-4c56-bf65-81cef205a649" providerId="ADAL" clId="{E3C3522B-5466-4779-B97D-3D5A961C1C8F}" dt="2023-03-31T04:40:18.247" v="56" actId="6549"/>
+        <pc:sldMkLst>
+          <pc:docMk/>
+          <pc:sldMk cId="2998567692" sldId="259"/>
+        </pc:sldMkLst>
+        <pc:spChg chg="mod">
+          <ac:chgData name="Nathan Ziehnert" userId="181e87c2-d4ba-4c56-bf65-81cef205a649" providerId="ADAL" clId="{E3C3522B-5466-4779-B97D-3D5A961C1C8F}" dt="2023-03-31T04:40:18.247" v="56" actId="6549"/>
+          <ac:spMkLst>
+            <pc:docMk/>
+            <pc:sldMk cId="2998567692" sldId="259"/>
+            <ac:spMk id="5" creationId="{CE5050AF-7D60-7B16-0E17-6467A67E504A}"/>
+          </ac:spMkLst>
+        </pc:spChg>
+      </pc:sldChg>
+      <pc:sldChg chg="modSp mod">
+        <pc:chgData name="Nathan Ziehnert" userId="181e87c2-d4ba-4c56-bf65-81cef205a649" providerId="ADAL" clId="{E3C3522B-5466-4779-B97D-3D5A961C1C8F}" dt="2023-03-31T05:31:37.040" v="3141" actId="20577"/>
+        <pc:sldMkLst>
+          <pc:docMk/>
+          <pc:sldMk cId="2539682485" sldId="264"/>
+        </pc:sldMkLst>
+        <pc:spChg chg="mod">
+          <ac:chgData name="Nathan Ziehnert" userId="181e87c2-d4ba-4c56-bf65-81cef205a649" providerId="ADAL" clId="{E3C3522B-5466-4779-B97D-3D5A961C1C8F}" dt="2023-03-31T05:31:37.040" v="3141" actId="20577"/>
+          <ac:spMkLst>
+            <pc:docMk/>
+            <pc:sldMk cId="2539682485" sldId="264"/>
+            <ac:spMk id="3" creationId="{66DD4736-B457-4813-972F-972A6C8D0318}"/>
+          </ac:spMkLst>
+        </pc:spChg>
+      </pc:sldChg>
+      <pc:sldChg chg="modSp mod">
+        <pc:chgData name="Nathan Ziehnert" userId="181e87c2-d4ba-4c56-bf65-81cef205a649" providerId="ADAL" clId="{E3C3522B-5466-4779-B97D-3D5A961C1C8F}" dt="2023-03-28T05:11:25.526" v="0" actId="20577"/>
+        <pc:sldMkLst>
+          <pc:docMk/>
+          <pc:sldMk cId="1522523435" sldId="271"/>
+        </pc:sldMkLst>
+        <pc:spChg chg="mod">
+          <ac:chgData name="Nathan Ziehnert" userId="181e87c2-d4ba-4c56-bf65-81cef205a649" providerId="ADAL" clId="{E3C3522B-5466-4779-B97D-3D5A961C1C8F}" dt="2023-03-28T05:11:25.526" v="0" actId="20577"/>
+          <ac:spMkLst>
+            <pc:docMk/>
+            <pc:sldMk cId="1522523435" sldId="271"/>
+            <ac:spMk id="4" creationId="{9887E118-43EF-4C11-8799-4B0519ACCF78}"/>
+          </ac:spMkLst>
+        </pc:spChg>
+      </pc:sldChg>
+      <pc:sldChg chg="modSp mod">
+        <pc:chgData name="Nathan Ziehnert" userId="181e87c2-d4ba-4c56-bf65-81cef205a649" providerId="ADAL" clId="{E3C3522B-5466-4779-B97D-3D5A961C1C8F}" dt="2023-03-28T05:11:41.807" v="1" actId="20577"/>
+        <pc:sldMkLst>
+          <pc:docMk/>
+          <pc:sldMk cId="2847865641" sldId="274"/>
+        </pc:sldMkLst>
+        <pc:spChg chg="mod">
+          <ac:chgData name="Nathan Ziehnert" userId="181e87c2-d4ba-4c56-bf65-81cef205a649" providerId="ADAL" clId="{E3C3522B-5466-4779-B97D-3D5A961C1C8F}" dt="2023-03-28T05:11:41.807" v="1" actId="20577"/>
+          <ac:spMkLst>
+            <pc:docMk/>
+            <pc:sldMk cId="2847865641" sldId="274"/>
+            <ac:spMk id="3" creationId="{05948842-5BF7-48C4-8988-BD9B98DD6437}"/>
+          </ac:spMkLst>
+        </pc:spChg>
+      </pc:sldChg>
+      <pc:sldChg chg="modSp add mod">
+        <pc:chgData name="Nathan Ziehnert" userId="181e87c2-d4ba-4c56-bf65-81cef205a649" providerId="ADAL" clId="{E3C3522B-5466-4779-B97D-3D5A961C1C8F}" dt="2023-03-31T05:07:25.772" v="2102" actId="207"/>
+        <pc:sldMkLst>
+          <pc:docMk/>
+          <pc:sldMk cId="487672952" sldId="278"/>
+        </pc:sldMkLst>
+        <pc:spChg chg="mod">
+          <ac:chgData name="Nathan Ziehnert" userId="181e87c2-d4ba-4c56-bf65-81cef205a649" providerId="ADAL" clId="{E3C3522B-5466-4779-B97D-3D5A961C1C8F}" dt="2023-03-31T05:07:25.772" v="2102" actId="207"/>
+          <ac:spMkLst>
+            <pc:docMk/>
+            <pc:sldMk cId="487672952" sldId="278"/>
+            <ac:spMk id="3" creationId="{66DD4736-B457-4813-972F-972A6C8D0318}"/>
+          </ac:spMkLst>
+        </pc:spChg>
+      </pc:sldChg>
+      <pc:sldChg chg="modSp add mod">
+        <pc:chgData name="Nathan Ziehnert" userId="181e87c2-d4ba-4c56-bf65-81cef205a649" providerId="ADAL" clId="{E3C3522B-5466-4779-B97D-3D5A961C1C8F}" dt="2023-03-31T05:15:28.140" v="2675" actId="2711"/>
+        <pc:sldMkLst>
+          <pc:docMk/>
+          <pc:sldMk cId="2199910864" sldId="279"/>
+        </pc:sldMkLst>
+        <pc:spChg chg="mod">
+          <ac:chgData name="Nathan Ziehnert" userId="181e87c2-d4ba-4c56-bf65-81cef205a649" providerId="ADAL" clId="{E3C3522B-5466-4779-B97D-3D5A961C1C8F}" dt="2023-03-31T05:15:28.140" v="2675" actId="2711"/>
+          <ac:spMkLst>
+            <pc:docMk/>
+            <pc:sldMk cId="2199910864" sldId="279"/>
+            <ac:spMk id="3" creationId="{66DD4736-B457-4813-972F-972A6C8D0318}"/>
+          </ac:spMkLst>
+        </pc:spChg>
+      </pc:sldChg>
+      <pc:sldChg chg="modSp add mod">
+        <pc:chgData name="Nathan Ziehnert" userId="181e87c2-d4ba-4c56-bf65-81cef205a649" providerId="ADAL" clId="{E3C3522B-5466-4779-B97D-3D5A961C1C8F}" dt="2023-03-31T05:13:06.273" v="2341" actId="20577"/>
+        <pc:sldMkLst>
+          <pc:docMk/>
+          <pc:sldMk cId="2425690725" sldId="280"/>
+        </pc:sldMkLst>
+        <pc:spChg chg="mod">
+          <ac:chgData name="Nathan Ziehnert" userId="181e87c2-d4ba-4c56-bf65-81cef205a649" providerId="ADAL" clId="{E3C3522B-5466-4779-B97D-3D5A961C1C8F}" dt="2023-03-31T05:13:06.273" v="2341" actId="20577"/>
+          <ac:spMkLst>
+            <pc:docMk/>
+            <pc:sldMk cId="2425690725" sldId="280"/>
+            <ac:spMk id="3" creationId="{66DD4736-B457-4813-972F-972A6C8D0318}"/>
+          </ac:spMkLst>
+        </pc:spChg>
+      </pc:sldChg>
+      <pc:sldChg chg="modSp add mod">
+        <pc:chgData name="Nathan Ziehnert" userId="181e87c2-d4ba-4c56-bf65-81cef205a649" providerId="ADAL" clId="{E3C3522B-5466-4779-B97D-3D5A961C1C8F}" dt="2023-03-31T05:31:05.881" v="2987" actId="20577"/>
+        <pc:sldMkLst>
+          <pc:docMk/>
+          <pc:sldMk cId="2198709616" sldId="281"/>
+        </pc:sldMkLst>
+        <pc:spChg chg="mod">
+          <ac:chgData name="Nathan Ziehnert" userId="181e87c2-d4ba-4c56-bf65-81cef205a649" providerId="ADAL" clId="{E3C3522B-5466-4779-B97D-3D5A961C1C8F}" dt="2023-03-31T05:30:37.858" v="2853" actId="20577"/>
+          <ac:spMkLst>
+            <pc:docMk/>
+            <pc:sldMk cId="2198709616" sldId="281"/>
+            <ac:spMk id="4" creationId="{2FD73D28-962F-8E43-5907-544A140D2750}"/>
+          </ac:spMkLst>
+        </pc:spChg>
+        <pc:spChg chg="mod">
+          <ac:chgData name="Nathan Ziehnert" userId="181e87c2-d4ba-4c56-bf65-81cef205a649" providerId="ADAL" clId="{E3C3522B-5466-4779-B97D-3D5A961C1C8F}" dt="2023-03-31T05:31:05.881" v="2987" actId="20577"/>
+          <ac:spMkLst>
+            <pc:docMk/>
+            <pc:sldMk cId="2198709616" sldId="281"/>
+            <ac:spMk id="5" creationId="{3B30A130-0D00-7790-26E9-044787E6435F}"/>
+          </ac:spMkLst>
+        </pc:spChg>
+      </pc:sldChg>
+    </pc:docChg>
+  </pc:docChgLst>
 </pc:chgInfo>
 </file>
 
@@ -5736,10 +5877,10 @@
       </p:grpSpPr>
       <p:sp>
         <p:nvSpPr>
-          <p:cNvPr id="2" name="Title 1">
-            <a:extLst>
-              <a:ext uri="{FF2B5EF4-FFF2-40B4-BE49-F238E27FC236}">
-                <a16:creationId xmlns:a16="http://schemas.microsoft.com/office/drawing/2014/main" id="{A21CF687-6E76-47D5-B217-BA5BC3C8CC4D}"/>
+          <p:cNvPr id="4" name="Title 3">
+            <a:extLst>
+              <a:ext uri="{FF2B5EF4-FFF2-40B4-BE49-F238E27FC236}">
+                <a16:creationId xmlns:a16="http://schemas.microsoft.com/office/drawing/2014/main" id="{526BC2B6-AE2C-3E1D-788D-592ABCDC14E7}"/>
               </a:ext>
             </a:extLst>
           </p:cNvPr>
@@ -5756,19 +5897,18 @@
           <a:lstStyle/>
           <a:p>
             <a:r>
-              <a:rPr lang="en-US" dirty="0" err="1"/>
-              <a:t>Input/Output</a:t>
-            </a:r>
-            <a:endParaRPr lang="en-US" dirty="0"/>
+              <a:rPr lang="en-US" dirty="0"/>
+              <a:t>Classes</a:t>
+            </a:r>
           </a:p>
         </p:txBody>
       </p:sp>
       <p:sp>
         <p:nvSpPr>
-          <p:cNvPr id="3" name="Content Placeholder 2">
-            <a:extLst>
-              <a:ext uri="{FF2B5EF4-FFF2-40B4-BE49-F238E27FC236}">
-                <a16:creationId xmlns:a16="http://schemas.microsoft.com/office/drawing/2014/main" id="{11F6FD59-E6BE-48A9-9D2D-1AADDDE51CAF}"/>
+          <p:cNvPr id="5" name="Text Placeholder 4">
+            <a:extLst>
+              <a:ext uri="{FF2B5EF4-FFF2-40B4-BE49-F238E27FC236}">
+                <a16:creationId xmlns:a16="http://schemas.microsoft.com/office/drawing/2014/main" id="{CE5050AF-7D60-7B16-0E17-6467A67E504A}"/>
               </a:ext>
             </a:extLst>
           </p:cNvPr>
@@ -5776,7 +5916,7 @@
             <a:spLocks noGrp="1"/>
           </p:cNvSpPr>
           <p:nvPr>
-            <p:ph idx="1"/>
+            <p:ph type="body" idx="1"/>
           </p:nvPr>
         </p:nvSpPr>
         <p:spPr/>
@@ -5786,19 +5926,7 @@
           <a:p>
             <a:r>
               <a:rPr lang="en-US" dirty="0"/>
-              <a:t>When do we use it?</a:t>
-            </a:r>
-          </a:p>
-          <a:p>
-            <a:r>
-              <a:rPr lang="en-US" dirty="0"/>
-              <a:t>When do we skip it?</a:t>
-            </a:r>
-          </a:p>
-          <a:p>
-            <a:r>
-              <a:rPr lang="en-US" dirty="0"/>
-              <a:t>What is it really?</a:t>
+              <a:t>Practical Examples… maybe</a:t>
             </a:r>
           </a:p>
         </p:txBody>
@@ -5806,7 +5934,7 @@
     </p:spTree>
     <p:extLst>
       <p:ext uri="{BB962C8B-B14F-4D97-AF65-F5344CB8AC3E}">
-        <p14:creationId xmlns:p14="http://schemas.microsoft.com/office/powerpoint/2010/main" val="2942774237"/>
+        <p14:creationId xmlns:p14="http://schemas.microsoft.com/office/powerpoint/2010/main" val="2998567692"/>
       </p:ext>
     </p:extLst>
   </p:cSld>
@@ -5838,7 +5966,7 @@
           <p:cNvPr id="4" name="Title 3">
             <a:extLst>
               <a:ext uri="{FF2B5EF4-FFF2-40B4-BE49-F238E27FC236}">
-                <a16:creationId xmlns:a16="http://schemas.microsoft.com/office/drawing/2014/main" id="{C2A5012E-B678-4ED2-A518-555DF8A50803}"/>
+                <a16:creationId xmlns:a16="http://schemas.microsoft.com/office/drawing/2014/main" id="{61C903EF-C4AE-4B02-BB88-7589883ED3B8}"/>
               </a:ext>
             </a:extLst>
           </p:cNvPr>
@@ -5856,17 +5984,17 @@
           <a:p>
             <a:r>
               <a:rPr lang="en-US" dirty="0"/>
-              <a:t>In-N-Out</a:t>
+              <a:t>Functions</a:t>
             </a:r>
           </a:p>
         </p:txBody>
       </p:sp>
       <p:sp>
         <p:nvSpPr>
-          <p:cNvPr id="5" name="Text Placeholder 4">
-            <a:extLst>
-              <a:ext uri="{FF2B5EF4-FFF2-40B4-BE49-F238E27FC236}">
-                <a16:creationId xmlns:a16="http://schemas.microsoft.com/office/drawing/2014/main" id="{9F6E65B5-9FD9-4BF0-A752-D8689AAB34CB}"/>
+          <p:cNvPr id="5" name="Content Placeholder 4">
+            <a:extLst>
+              <a:ext uri="{FF2B5EF4-FFF2-40B4-BE49-F238E27FC236}">
+                <a16:creationId xmlns:a16="http://schemas.microsoft.com/office/drawing/2014/main" id="{BF1CF2CE-BE28-4F3F-9486-D9627B4A5BDB}"/>
               </a:ext>
             </a:extLst>
           </p:cNvPr>
@@ -5874,7 +6002,7 @@
             <a:spLocks noGrp="1"/>
           </p:cNvSpPr>
           <p:nvPr>
-            <p:ph type="body" idx="1"/>
+            <p:ph idx="1"/>
           </p:nvPr>
         </p:nvSpPr>
         <p:spPr/>
@@ -5884,7 +6012,43 @@
           <a:p>
             <a:r>
               <a:rPr lang="en-US" dirty="0"/>
-              <a:t>Processing Input and Output</a:t>
+              <a:t>Functions are like cmdlets that you define in your code</a:t>
+            </a:r>
+          </a:p>
+          <a:p>
+            <a:r>
+              <a:rPr lang="en-US" dirty="0"/>
+              <a:t>Can be part of a script, module, or session</a:t>
+            </a:r>
+          </a:p>
+          <a:p>
+            <a:r>
+              <a:rPr lang="en-US" dirty="0"/>
+              <a:t>May or may not return an object</a:t>
+            </a:r>
+          </a:p>
+          <a:p>
+            <a:r>
+              <a:rPr lang="en-US" dirty="0"/>
+              <a:t>Great for repetitive code blocks</a:t>
+            </a:r>
+          </a:p>
+          <a:p>
+            <a:r>
+              <a:rPr lang="en-US" dirty="0"/>
+              <a:t>Can reduce memory pressure in some situation, add to it in others</a:t>
+            </a:r>
+          </a:p>
+          <a:p>
+            <a:r>
+              <a:rPr lang="en-US" dirty="0"/>
+              <a:t>Can reduce speed in some situations</a:t>
+            </a:r>
+          </a:p>
+          <a:p>
+            <a:r>
+              <a:rPr lang="en-US" dirty="0"/>
+              <a:t>Allows one to make use of the pipeline</a:t>
             </a:r>
           </a:p>
         </p:txBody>
@@ -5892,7 +6056,7 @@
     </p:spTree>
     <p:extLst>
       <p:ext uri="{BB962C8B-B14F-4D97-AF65-F5344CB8AC3E}">
-        <p14:creationId xmlns:p14="http://schemas.microsoft.com/office/powerpoint/2010/main" val="3301494009"/>
+        <p14:creationId xmlns:p14="http://schemas.microsoft.com/office/powerpoint/2010/main" val="3244135314"/>
       </p:ext>
     </p:extLst>
   </p:cSld>
@@ -5924,7 +6088,7 @@
           <p:cNvPr id="2" name="Title 1">
             <a:extLst>
               <a:ext uri="{FF2B5EF4-FFF2-40B4-BE49-F238E27FC236}">
-                <a16:creationId xmlns:a16="http://schemas.microsoft.com/office/drawing/2014/main" id="{3BE9DBC9-38D4-42A0-A382-CBE26DBC7A38}"/>
+                <a16:creationId xmlns:a16="http://schemas.microsoft.com/office/drawing/2014/main" id="{BD6D1BFA-BB4C-4595-859E-D2734B1F0873}"/>
               </a:ext>
             </a:extLst>
           </p:cNvPr>
@@ -5942,17 +6106,17 @@
           <a:p>
             <a:r>
               <a:rPr lang="en-US" dirty="0"/>
-              <a:t>Built-in Variables</a:t>
+              <a:t>Functions</a:t>
             </a:r>
           </a:p>
         </p:txBody>
       </p:sp>
       <p:sp>
         <p:nvSpPr>
-          <p:cNvPr id="3" name="Content Placeholder 2">
-            <a:extLst>
-              <a:ext uri="{FF2B5EF4-FFF2-40B4-BE49-F238E27FC236}">
-                <a16:creationId xmlns:a16="http://schemas.microsoft.com/office/drawing/2014/main" id="{4017A3FE-2185-4CE7-AD24-6B6903EB1BB1}"/>
+          <p:cNvPr id="3" name="Text Placeholder 2">
+            <a:extLst>
+              <a:ext uri="{FF2B5EF4-FFF2-40B4-BE49-F238E27FC236}">
+                <a16:creationId xmlns:a16="http://schemas.microsoft.com/office/drawing/2014/main" id="{D8B4B01B-F69D-42F5-BE9C-56FD1EFEF721}"/>
               </a:ext>
             </a:extLst>
           </p:cNvPr>
@@ -5960,7 +6124,7 @@
             <a:spLocks noGrp="1"/>
           </p:cNvSpPr>
           <p:nvPr>
-            <p:ph idx="1"/>
+            <p:ph type="body" idx="1"/>
           </p:nvPr>
         </p:nvSpPr>
         <p:spPr/>
@@ -5970,19 +6134,7 @@
           <a:p>
             <a:r>
               <a:rPr lang="en-US" dirty="0"/>
-              <a:t>How do we find them?</a:t>
-            </a:r>
-          </a:p>
-          <a:p>
-            <a:r>
-              <a:rPr lang="en-US" dirty="0"/>
-              <a:t>What are they good for?</a:t>
-            </a:r>
-          </a:p>
-          <a:p>
-            <a:r>
-              <a:rPr lang="en-US" dirty="0"/>
-              <a:t>Real world usage scenarios?</a:t>
+              <a:t>Better than a school dance</a:t>
             </a:r>
           </a:p>
         </p:txBody>
@@ -5990,7 +6142,7 @@
     </p:spTree>
     <p:extLst>
       <p:ext uri="{BB962C8B-B14F-4D97-AF65-F5344CB8AC3E}">
-        <p14:creationId xmlns:p14="http://schemas.microsoft.com/office/powerpoint/2010/main" val="235817471"/>
+        <p14:creationId xmlns:p14="http://schemas.microsoft.com/office/powerpoint/2010/main" val="2844249970"/>
       </p:ext>
     </p:extLst>
   </p:cSld>
@@ -6022,7 +6174,7 @@
           <p:cNvPr id="4" name="Title 3">
             <a:extLst>
               <a:ext uri="{FF2B5EF4-FFF2-40B4-BE49-F238E27FC236}">
-                <a16:creationId xmlns:a16="http://schemas.microsoft.com/office/drawing/2014/main" id="{9887E118-43EF-4C11-8799-4B0519ACCF78}"/>
+                <a16:creationId xmlns:a16="http://schemas.microsoft.com/office/drawing/2014/main" id="{68342346-EC0E-4FC5-A7D7-2D236AD7DCDD}"/>
               </a:ext>
             </a:extLst>
           </p:cNvPr>
@@ -6039,45 +6191,107 @@
           <a:lstStyle/>
           <a:p>
             <a:r>
+              <a:rPr lang="en-US" dirty="0"/>
+              <a:t>Shotput, Putt-Putt, Input, </a:t>
+            </a:r>
+            <a:r>
               <a:rPr lang="en-US" dirty="0" err="1"/>
-              <a:t>Variablitiy</a:t>
+              <a:t>Ouput</a:t>
             </a:r>
             <a:endParaRPr lang="en-US" dirty="0"/>
           </a:p>
         </p:txBody>
       </p:sp>
+      <p:pic>
+        <p:nvPicPr>
+          <p:cNvPr id="7" name="Content Placeholder 6">
+            <a:extLst>
+              <a:ext uri="{FF2B5EF4-FFF2-40B4-BE49-F238E27FC236}">
+                <a16:creationId xmlns:a16="http://schemas.microsoft.com/office/drawing/2014/main" id="{EBF7F75D-518E-4BE8-8C66-E4F1C19EF33C}"/>
+              </a:ext>
+            </a:extLst>
+          </p:cNvPr>
+          <p:cNvPicPr>
+            <a:picLocks noGrp="1" noChangeAspect="1"/>
+          </p:cNvPicPr>
+          <p:nvPr>
+            <p:ph idx="1"/>
+          </p:nvPr>
+        </p:nvPicPr>
+        <p:blipFill>
+          <a:blip r:embed="rId2">
+            <a:extLst>
+              <a:ext uri="{28A0092B-C50C-407E-A947-70E740481C1C}">
+                <a14:useLocalDpi xmlns:a14="http://schemas.microsoft.com/office/drawing/2010/main" val="0"/>
+              </a:ext>
+              <a:ext uri="{837473B0-CC2E-450A-ABE3-18F120FF3D39}">
+                <a1611:picAttrSrcUrl xmlns:a1611="http://schemas.microsoft.com/office/drawing/2016/11/main" r:id="rId3"/>
+              </a:ext>
+            </a:extLst>
+          </a:blip>
+          <a:stretch>
+            <a:fillRect/>
+          </a:stretch>
+        </p:blipFill>
+        <p:spPr>
+          <a:xfrm>
+            <a:off x="4826000" y="2115344"/>
+            <a:ext cx="2540000" cy="3454400"/>
+          </a:xfrm>
+        </p:spPr>
+      </p:pic>
       <p:sp>
         <p:nvSpPr>
-          <p:cNvPr id="5" name="Text Placeholder 4">
-            <a:extLst>
-              <a:ext uri="{FF2B5EF4-FFF2-40B4-BE49-F238E27FC236}">
-                <a16:creationId xmlns:a16="http://schemas.microsoft.com/office/drawing/2014/main" id="{BF8F10F2-CB07-4FF6-8A86-9F40B63C8C8B}"/>
-              </a:ext>
-            </a:extLst>
-          </p:cNvPr>
-          <p:cNvSpPr>
-            <a:spLocks noGrp="1"/>
-          </p:cNvSpPr>
-          <p:nvPr>
-            <p:ph type="body" idx="1"/>
-          </p:nvPr>
+          <p:cNvPr id="8" name="TextBox 7">
+            <a:extLst>
+              <a:ext uri="{FF2B5EF4-FFF2-40B4-BE49-F238E27FC236}">
+                <a16:creationId xmlns:a16="http://schemas.microsoft.com/office/drawing/2014/main" id="{702174B2-32B2-4E0A-BBB9-6526459CEEA3}"/>
+              </a:ext>
+            </a:extLst>
+          </p:cNvPr>
+          <p:cNvSpPr txBox="1"/>
+          <p:nvPr/>
         </p:nvSpPr>
-        <p:spPr/>
+        <p:spPr>
+          <a:xfrm>
+            <a:off x="4826000" y="5569744"/>
+            <a:ext cx="2540000" cy="369332"/>
+          </a:xfrm>
+          <a:prstGeom prst="rect">
+            <a:avLst/>
+          </a:prstGeom>
+          <a:noFill/>
+        </p:spPr>
         <p:txBody>
-          <a:bodyPr/>
+          <a:bodyPr wrap="square" rtlCol="0">
+            <a:spAutoFit/>
+          </a:bodyPr>
           <a:lstStyle/>
           <a:p>
             <a:r>
-              <a:rPr lang="en-US" dirty="0"/>
-              <a:t>What we can use the built-in variables for</a:t>
-            </a:r>
+              <a:rPr lang="en-US" sz="900">
+                <a:hlinkClick r:id="rId3" tooltip="https://en.wikipedia.org/wiki/One_Fish_Two_Fish_Red_Fish_Blue_Fish"/>
+              </a:rPr>
+              <a:t>This Photo</a:t>
+            </a:r>
+            <a:r>
+              <a:rPr lang="en-US" sz="900"/>
+              <a:t> by Unknown Author is licensed under </a:t>
+            </a:r>
+            <a:r>
+              <a:rPr lang="en-US" sz="900">
+                <a:hlinkClick r:id="rId4" tooltip="https://creativecommons.org/licenses/by-sa/3.0/"/>
+              </a:rPr>
+              <a:t>CC BY-SA</a:t>
+            </a:r>
+            <a:endParaRPr lang="en-US" sz="900"/>
           </a:p>
         </p:txBody>
       </p:sp>
     </p:spTree>
     <p:extLst>
       <p:ext uri="{BB962C8B-B14F-4D97-AF65-F5344CB8AC3E}">
-        <p14:creationId xmlns:p14="http://schemas.microsoft.com/office/powerpoint/2010/main" val="1522523435"/>
+        <p14:creationId xmlns:p14="http://schemas.microsoft.com/office/powerpoint/2010/main" val="1409399340"/>
       </p:ext>
     </p:extLst>
   </p:cSld>
@@ -6109,7 +6323,7 @@
           <p:cNvPr id="2" name="Title 1">
             <a:extLst>
               <a:ext uri="{FF2B5EF4-FFF2-40B4-BE49-F238E27FC236}">
-                <a16:creationId xmlns:a16="http://schemas.microsoft.com/office/drawing/2014/main" id="{B96FE38C-E8C3-408E-AD27-61A1C2826BE4}"/>
+                <a16:creationId xmlns:a16="http://schemas.microsoft.com/office/drawing/2014/main" id="{A21CF687-6E76-47D5-B217-BA5BC3C8CC4D}"/>
               </a:ext>
             </a:extLst>
           </p:cNvPr>
@@ -6126,9 +6340,10 @@
           <a:lstStyle/>
           <a:p>
             <a:r>
-              <a:rPr lang="en-US" dirty="0"/>
-              <a:t>API Calls</a:t>
-            </a:r>
+              <a:rPr lang="en-US" dirty="0" err="1"/>
+              <a:t>Input/Output</a:t>
+            </a:r>
+            <a:endParaRPr lang="en-US" dirty="0"/>
           </a:p>
         </p:txBody>
       </p:sp>
@@ -6137,7 +6352,7 @@
           <p:cNvPr id="3" name="Content Placeholder 2">
             <a:extLst>
               <a:ext uri="{FF2B5EF4-FFF2-40B4-BE49-F238E27FC236}">
-                <a16:creationId xmlns:a16="http://schemas.microsoft.com/office/drawing/2014/main" id="{68D67578-CCF9-4CB3-B9E9-456A4079072A}"/>
+                <a16:creationId xmlns:a16="http://schemas.microsoft.com/office/drawing/2014/main" id="{11F6FD59-E6BE-48A9-9D2D-1AADDDE51CAF}"/>
               </a:ext>
             </a:extLst>
           </p:cNvPr>
@@ -6155,29 +6370,19 @@
           <a:p>
             <a:r>
               <a:rPr lang="en-US" dirty="0"/>
-              <a:t>Invoke-</a:t>
-            </a:r>
-            <a:r>
-              <a:rPr lang="en-US" dirty="0" err="1"/>
-              <a:t>RestMethod</a:t>
-            </a:r>
-            <a:endParaRPr lang="en-US" dirty="0"/>
-          </a:p>
-          <a:p>
-            <a:r>
-              <a:rPr lang="en-US" dirty="0"/>
-              <a:t>Invoke-</a:t>
-            </a:r>
-            <a:r>
-              <a:rPr lang="en-US" dirty="0" err="1"/>
-              <a:t>WebRequest</a:t>
-            </a:r>
-            <a:endParaRPr lang="en-US" dirty="0"/>
-          </a:p>
-          <a:p>
-            <a:r>
-              <a:rPr lang="en-US" dirty="0"/>
-              <a:t>Other?</a:t>
+              <a:t>When do we use it?</a:t>
+            </a:r>
+          </a:p>
+          <a:p>
+            <a:r>
+              <a:rPr lang="en-US" dirty="0"/>
+              <a:t>When do we skip it?</a:t>
+            </a:r>
+          </a:p>
+          <a:p>
+            <a:r>
+              <a:rPr lang="en-US" dirty="0"/>
+              <a:t>What is it really?</a:t>
             </a:r>
           </a:p>
         </p:txBody>
@@ -6185,7 +6390,7 @@
     </p:spTree>
     <p:extLst>
       <p:ext uri="{BB962C8B-B14F-4D97-AF65-F5344CB8AC3E}">
-        <p14:creationId xmlns:p14="http://schemas.microsoft.com/office/powerpoint/2010/main" val="3577861595"/>
+        <p14:creationId xmlns:p14="http://schemas.microsoft.com/office/powerpoint/2010/main" val="2942774237"/>
       </p:ext>
     </p:extLst>
   </p:cSld>
@@ -6217,7 +6422,7 @@
           <p:cNvPr id="4" name="Title 3">
             <a:extLst>
               <a:ext uri="{FF2B5EF4-FFF2-40B4-BE49-F238E27FC236}">
-                <a16:creationId xmlns:a16="http://schemas.microsoft.com/office/drawing/2014/main" id="{8C012C0B-453E-4CEC-AD69-A30829980E3A}"/>
+                <a16:creationId xmlns:a16="http://schemas.microsoft.com/office/drawing/2014/main" id="{C2A5012E-B678-4ED2-A518-555DF8A50803}"/>
               </a:ext>
             </a:extLst>
           </p:cNvPr>
@@ -6235,7 +6440,7 @@
           <a:p>
             <a:r>
               <a:rPr lang="en-US" dirty="0"/>
-              <a:t>APIs</a:t>
+              <a:t>In-N-Out</a:t>
             </a:r>
           </a:p>
         </p:txBody>
@@ -6245,7 +6450,7 @@
           <p:cNvPr id="5" name="Text Placeholder 4">
             <a:extLst>
               <a:ext uri="{FF2B5EF4-FFF2-40B4-BE49-F238E27FC236}">
-                <a16:creationId xmlns:a16="http://schemas.microsoft.com/office/drawing/2014/main" id="{A1D7B490-B781-49DD-8E88-DCA11A81BD25}"/>
+                <a16:creationId xmlns:a16="http://schemas.microsoft.com/office/drawing/2014/main" id="{9F6E65B5-9FD9-4BF0-A752-D8689AAB34CB}"/>
               </a:ext>
             </a:extLst>
           </p:cNvPr>
@@ -6262,12 +6467,8 @@
           <a:lstStyle/>
           <a:p>
             <a:r>
-              <a:rPr lang="en-US" dirty="0" err="1"/>
-              <a:t>Talkin</a:t>
-            </a:r>
-            <a:r>
-              <a:rPr lang="en-US" dirty="0"/>
-              <a:t>’ to other stuff</a:t>
+              <a:rPr lang="en-US" dirty="0"/>
+              <a:t>Processing Input and Output</a:t>
             </a:r>
           </a:p>
         </p:txBody>
@@ -6275,7 +6476,7 @@
     </p:spTree>
     <p:extLst>
       <p:ext uri="{BB962C8B-B14F-4D97-AF65-F5344CB8AC3E}">
-        <p14:creationId xmlns:p14="http://schemas.microsoft.com/office/powerpoint/2010/main" val="689120612"/>
+        <p14:creationId xmlns:p14="http://schemas.microsoft.com/office/powerpoint/2010/main" val="3301494009"/>
       </p:ext>
     </p:extLst>
   </p:cSld>
@@ -6307,7 +6508,7 @@
           <p:cNvPr id="2" name="Title 1">
             <a:extLst>
               <a:ext uri="{FF2B5EF4-FFF2-40B4-BE49-F238E27FC236}">
-                <a16:creationId xmlns:a16="http://schemas.microsoft.com/office/drawing/2014/main" id="{1C0126C1-8A8C-4173-991A-D616C5E8C3E3}"/>
+                <a16:creationId xmlns:a16="http://schemas.microsoft.com/office/drawing/2014/main" id="{3BE9DBC9-38D4-42A0-A382-CBE26DBC7A38}"/>
               </a:ext>
             </a:extLst>
           </p:cNvPr>
@@ -6325,7 +6526,7 @@
           <a:p>
             <a:r>
               <a:rPr lang="en-US" dirty="0"/>
-              <a:t>.NET</a:t>
+              <a:t>Built-in Variables</a:t>
             </a:r>
           </a:p>
         </p:txBody>
@@ -6335,7 +6536,7 @@
           <p:cNvPr id="3" name="Content Placeholder 2">
             <a:extLst>
               <a:ext uri="{FF2B5EF4-FFF2-40B4-BE49-F238E27FC236}">
-                <a16:creationId xmlns:a16="http://schemas.microsoft.com/office/drawing/2014/main" id="{05948842-5BF7-48C4-8988-BD9B98DD6437}"/>
+                <a16:creationId xmlns:a16="http://schemas.microsoft.com/office/drawing/2014/main" id="{4017A3FE-2185-4CE7-AD24-6B6903EB1BB1}"/>
               </a:ext>
             </a:extLst>
           </p:cNvPr>
@@ -6353,47 +6554,19 @@
           <a:p>
             <a:r>
               <a:rPr lang="en-US" dirty="0"/>
-              <a:t>PowerShell is built on .NET</a:t>
-            </a:r>
-          </a:p>
-          <a:p>
-            <a:r>
-              <a:rPr lang="en-US" dirty="0"/>
-              <a:t>Windows PowerShell</a:t>
-            </a:r>
-          </a:p>
-          <a:p>
-            <a:pPr lvl="1"/>
-            <a:r>
-              <a:rPr lang="en-US" dirty="0"/>
-              <a:t>.NET Framework 5.x</a:t>
-            </a:r>
-          </a:p>
-          <a:p>
-            <a:pPr lvl="1"/>
-            <a:r>
-              <a:rPr lang="en-US" dirty="0"/>
-              <a:t>Windows Only</a:t>
-            </a:r>
-          </a:p>
-          <a:p>
-            <a:r>
-              <a:rPr lang="en-US" dirty="0"/>
-              <a:t>PowerShell Core</a:t>
-            </a:r>
-          </a:p>
-          <a:p>
-            <a:pPr lvl="1"/>
-            <a:r>
-              <a:rPr lang="en-US" dirty="0"/>
-              <a:t>.NET Core Framework (6/7)</a:t>
-            </a:r>
-          </a:p>
-          <a:p>
-            <a:pPr lvl="1"/>
-            <a:r>
-              <a:rPr lang="en-US" dirty="0"/>
-              <a:t>Cross-Platform (Including Windows)</a:t>
+              <a:t>How do we find them?</a:t>
+            </a:r>
+          </a:p>
+          <a:p>
+            <a:r>
+              <a:rPr lang="en-US" dirty="0"/>
+              <a:t>What are they good for?</a:t>
+            </a:r>
+          </a:p>
+          <a:p>
+            <a:r>
+              <a:rPr lang="en-US" dirty="0"/>
+              <a:t>Real world usage scenarios?</a:t>
             </a:r>
           </a:p>
         </p:txBody>
@@ -6401,7 +6574,7 @@
     </p:spTree>
     <p:extLst>
       <p:ext uri="{BB962C8B-B14F-4D97-AF65-F5344CB8AC3E}">
-        <p14:creationId xmlns:p14="http://schemas.microsoft.com/office/powerpoint/2010/main" val="2847865641"/>
+        <p14:creationId xmlns:p14="http://schemas.microsoft.com/office/powerpoint/2010/main" val="235817471"/>
       </p:ext>
     </p:extLst>
   </p:cSld>
@@ -6433,7 +6606,7 @@
           <p:cNvPr id="4" name="Title 3">
             <a:extLst>
               <a:ext uri="{FF2B5EF4-FFF2-40B4-BE49-F238E27FC236}">
-                <a16:creationId xmlns:a16="http://schemas.microsoft.com/office/drawing/2014/main" id="{453B0534-F4C1-4A35-ABC0-61A9FFC4A17C}"/>
+                <a16:creationId xmlns:a16="http://schemas.microsoft.com/office/drawing/2014/main" id="{9887E118-43EF-4C11-8799-4B0519ACCF78}"/>
               </a:ext>
             </a:extLst>
           </p:cNvPr>
@@ -6450,9 +6623,10 @@
           <a:lstStyle/>
           <a:p>
             <a:r>
-              <a:rPr lang="en-US" dirty="0"/>
-              <a:t>.NET</a:t>
-            </a:r>
+              <a:rPr lang="en-US" dirty="0" err="1"/>
+              <a:t>Variabilitiy</a:t>
+            </a:r>
+            <a:endParaRPr lang="en-US" dirty="0"/>
           </a:p>
         </p:txBody>
       </p:sp>
@@ -6461,7 +6635,7 @@
           <p:cNvPr id="5" name="Text Placeholder 4">
             <a:extLst>
               <a:ext uri="{FF2B5EF4-FFF2-40B4-BE49-F238E27FC236}">
-                <a16:creationId xmlns:a16="http://schemas.microsoft.com/office/drawing/2014/main" id="{61A0B68E-8604-485D-A07E-6B294211A5E8}"/>
+                <a16:creationId xmlns:a16="http://schemas.microsoft.com/office/drawing/2014/main" id="{BF8F10F2-CB07-4FF6-8A86-9F40B63C8C8B}"/>
               </a:ext>
             </a:extLst>
           </p:cNvPr>
@@ -6479,7 +6653,7 @@
           <a:p>
             <a:r>
               <a:rPr lang="en-US" dirty="0"/>
-              <a:t>Fishing for scripts</a:t>
+              <a:t>What we can use the built-in variables for</a:t>
             </a:r>
           </a:p>
         </p:txBody>
@@ -6487,7 +6661,7 @@
     </p:spTree>
     <p:extLst>
       <p:ext uri="{BB962C8B-B14F-4D97-AF65-F5344CB8AC3E}">
-        <p14:creationId xmlns:p14="http://schemas.microsoft.com/office/powerpoint/2010/main" val="994814657"/>
+        <p14:creationId xmlns:p14="http://schemas.microsoft.com/office/powerpoint/2010/main" val="1522523435"/>
       </p:ext>
     </p:extLst>
   </p:cSld>
@@ -6519,7 +6693,7 @@
           <p:cNvPr id="2" name="Title 1">
             <a:extLst>
               <a:ext uri="{FF2B5EF4-FFF2-40B4-BE49-F238E27FC236}">
-                <a16:creationId xmlns:a16="http://schemas.microsoft.com/office/drawing/2014/main" id="{68E982BE-BD12-477A-BF79-27B68B7A382C}"/>
+                <a16:creationId xmlns:a16="http://schemas.microsoft.com/office/drawing/2014/main" id="{B96FE38C-E8C3-408E-AD27-61A1C2826BE4}"/>
               </a:ext>
             </a:extLst>
           </p:cNvPr>
@@ -6537,7 +6711,7 @@
           <a:p>
             <a:r>
               <a:rPr lang="en-US" dirty="0"/>
-              <a:t>Core Workout</a:t>
+              <a:t>API Calls</a:t>
             </a:r>
           </a:p>
         </p:txBody>
@@ -6547,7 +6721,7 @@
           <p:cNvPr id="3" name="Content Placeholder 2">
             <a:extLst>
               <a:ext uri="{FF2B5EF4-FFF2-40B4-BE49-F238E27FC236}">
-                <a16:creationId xmlns:a16="http://schemas.microsoft.com/office/drawing/2014/main" id="{B9D04904-BE45-4835-8899-7EA488995C1F}"/>
+                <a16:creationId xmlns:a16="http://schemas.microsoft.com/office/drawing/2014/main" id="{68D67578-CCF9-4CB3-B9E9-456A4079072A}"/>
               </a:ext>
             </a:extLst>
           </p:cNvPr>
@@ -6565,43 +6739,29 @@
           <a:p>
             <a:r>
               <a:rPr lang="en-US" dirty="0"/>
-              <a:t>PowerShell 7 is the bees knees!</a:t>
-            </a:r>
-          </a:p>
-          <a:p>
-            <a:r>
-              <a:rPr lang="en-US" dirty="0"/>
-              <a:t>Improved modules</a:t>
-            </a:r>
-          </a:p>
-          <a:p>
-            <a:r>
-              <a:rPr lang="en-US" dirty="0"/>
-              <a:t>Support for almost all Windows PowerShell modules</a:t>
-            </a:r>
-          </a:p>
-          <a:p>
-            <a:r>
-              <a:rPr lang="en-US" dirty="0"/>
-              <a:t>Some nuances with legacy modules</a:t>
-            </a:r>
-          </a:p>
-          <a:p>
-            <a:r>
-              <a:rPr lang="en-US" dirty="0"/>
-              <a:t>Faster?</a:t>
-            </a:r>
-          </a:p>
-          <a:p>
-            <a:r>
-              <a:rPr lang="en-US" dirty="0"/>
-              <a:t>More Colorful?</a:t>
-            </a:r>
-          </a:p>
-          <a:p>
-            <a:r>
-              <a:rPr lang="en-US" dirty="0"/>
-              <a:t>Not perfect for every situation</a:t>
+              <a:t>Invoke-</a:t>
+            </a:r>
+            <a:r>
+              <a:rPr lang="en-US" dirty="0" err="1"/>
+              <a:t>RestMethod</a:t>
+            </a:r>
+            <a:endParaRPr lang="en-US" dirty="0"/>
+          </a:p>
+          <a:p>
+            <a:r>
+              <a:rPr lang="en-US" dirty="0"/>
+              <a:t>Invoke-</a:t>
+            </a:r>
+            <a:r>
+              <a:rPr lang="en-US" dirty="0" err="1"/>
+              <a:t>WebRequest</a:t>
+            </a:r>
+            <a:endParaRPr lang="en-US" dirty="0"/>
+          </a:p>
+          <a:p>
+            <a:r>
+              <a:rPr lang="en-US" dirty="0"/>
+              <a:t>Other?</a:t>
             </a:r>
           </a:p>
         </p:txBody>
@@ -6609,7 +6769,7 @@
     </p:spTree>
     <p:extLst>
       <p:ext uri="{BB962C8B-B14F-4D97-AF65-F5344CB8AC3E}">
-        <p14:creationId xmlns:p14="http://schemas.microsoft.com/office/powerpoint/2010/main" val="661869269"/>
+        <p14:creationId xmlns:p14="http://schemas.microsoft.com/office/powerpoint/2010/main" val="3577861595"/>
       </p:ext>
     </p:extLst>
   </p:cSld>
@@ -6641,7 +6801,7 @@
           <p:cNvPr id="4" name="Title 3">
             <a:extLst>
               <a:ext uri="{FF2B5EF4-FFF2-40B4-BE49-F238E27FC236}">
-                <a16:creationId xmlns:a16="http://schemas.microsoft.com/office/drawing/2014/main" id="{1E59359C-B515-46FE-912B-9B9E583ACC6F}"/>
+                <a16:creationId xmlns:a16="http://schemas.microsoft.com/office/drawing/2014/main" id="{8C012C0B-453E-4CEC-AD69-A30829980E3A}"/>
               </a:ext>
             </a:extLst>
           </p:cNvPr>
@@ -6659,7 +6819,7 @@
           <a:p>
             <a:r>
               <a:rPr lang="en-US" dirty="0"/>
-              <a:t>PowerShell 7</a:t>
+              <a:t>APIs</a:t>
             </a:r>
           </a:p>
         </p:txBody>
@@ -6669,7 +6829,7 @@
           <p:cNvPr id="5" name="Text Placeholder 4">
             <a:extLst>
               <a:ext uri="{FF2B5EF4-FFF2-40B4-BE49-F238E27FC236}">
-                <a16:creationId xmlns:a16="http://schemas.microsoft.com/office/drawing/2014/main" id="{2E8EC464-D977-42A6-8022-BBFB1EE02C73}"/>
+                <a16:creationId xmlns:a16="http://schemas.microsoft.com/office/drawing/2014/main" id="{A1D7B490-B781-49DD-8E88-DCA11A81BD25}"/>
               </a:ext>
             </a:extLst>
           </p:cNvPr>
@@ -6686,8 +6846,12 @@
           <a:lstStyle/>
           <a:p>
             <a:r>
-              <a:rPr lang="en-US" dirty="0"/>
-              <a:t>What do we get out of it?</a:t>
+              <a:rPr lang="en-US" dirty="0" err="1"/>
+              <a:t>Talkin</a:t>
+            </a:r>
+            <a:r>
+              <a:rPr lang="en-US" dirty="0"/>
+              <a:t>’ to other stuff</a:t>
             </a:r>
           </a:p>
         </p:txBody>
@@ -6695,7 +6859,7 @@
     </p:spTree>
     <p:extLst>
       <p:ext uri="{BB962C8B-B14F-4D97-AF65-F5344CB8AC3E}">
-        <p14:creationId xmlns:p14="http://schemas.microsoft.com/office/powerpoint/2010/main" val="3448033158"/>
+        <p14:creationId xmlns:p14="http://schemas.microsoft.com/office/powerpoint/2010/main" val="689120612"/>
       </p:ext>
     </p:extLst>
   </p:cSld>
@@ -7055,6 +7219,434 @@
       </p:grpSpPr>
       <p:sp>
         <p:nvSpPr>
+          <p:cNvPr id="2" name="Title 1">
+            <a:extLst>
+              <a:ext uri="{FF2B5EF4-FFF2-40B4-BE49-F238E27FC236}">
+                <a16:creationId xmlns:a16="http://schemas.microsoft.com/office/drawing/2014/main" id="{1C0126C1-8A8C-4173-991A-D616C5E8C3E3}"/>
+              </a:ext>
+            </a:extLst>
+          </p:cNvPr>
+          <p:cNvSpPr>
+            <a:spLocks noGrp="1"/>
+          </p:cNvSpPr>
+          <p:nvPr>
+            <p:ph type="title"/>
+          </p:nvPr>
+        </p:nvSpPr>
+        <p:spPr/>
+        <p:txBody>
+          <a:bodyPr/>
+          <a:lstStyle/>
+          <a:p>
+            <a:r>
+              <a:rPr lang="en-US" dirty="0"/>
+              <a:t>.NET</a:t>
+            </a:r>
+          </a:p>
+        </p:txBody>
+      </p:sp>
+      <p:sp>
+        <p:nvSpPr>
+          <p:cNvPr id="3" name="Content Placeholder 2">
+            <a:extLst>
+              <a:ext uri="{FF2B5EF4-FFF2-40B4-BE49-F238E27FC236}">
+                <a16:creationId xmlns:a16="http://schemas.microsoft.com/office/drawing/2014/main" id="{05948842-5BF7-48C4-8988-BD9B98DD6437}"/>
+              </a:ext>
+            </a:extLst>
+          </p:cNvPr>
+          <p:cNvSpPr>
+            <a:spLocks noGrp="1"/>
+          </p:cNvSpPr>
+          <p:nvPr>
+            <p:ph idx="1"/>
+          </p:nvPr>
+        </p:nvSpPr>
+        <p:spPr/>
+        <p:txBody>
+          <a:bodyPr/>
+          <a:lstStyle/>
+          <a:p>
+            <a:r>
+              <a:rPr lang="en-US" dirty="0"/>
+              <a:t>PowerShell is built on .NET</a:t>
+            </a:r>
+          </a:p>
+          <a:p>
+            <a:r>
+              <a:rPr lang="en-US" dirty="0"/>
+              <a:t>Windows PowerShell</a:t>
+            </a:r>
+          </a:p>
+          <a:p>
+            <a:pPr lvl="1"/>
+            <a:r>
+              <a:rPr lang="en-US" dirty="0"/>
+              <a:t>.NET </a:t>
+            </a:r>
+            <a:r>
+              <a:rPr lang="en-US"/>
+              <a:t>Framework 4.</a:t>
+            </a:r>
+            <a:r>
+              <a:rPr lang="en-US" dirty="0"/>
+              <a:t>x</a:t>
+            </a:r>
+          </a:p>
+          <a:p>
+            <a:pPr lvl="1"/>
+            <a:r>
+              <a:rPr lang="en-US" dirty="0"/>
+              <a:t>Windows Only</a:t>
+            </a:r>
+          </a:p>
+          <a:p>
+            <a:r>
+              <a:rPr lang="en-US" dirty="0"/>
+              <a:t>PowerShell Core</a:t>
+            </a:r>
+          </a:p>
+          <a:p>
+            <a:pPr lvl="1"/>
+            <a:r>
+              <a:rPr lang="en-US" dirty="0"/>
+              <a:t>.NET Core Framework (6/7)</a:t>
+            </a:r>
+          </a:p>
+          <a:p>
+            <a:pPr lvl="1"/>
+            <a:r>
+              <a:rPr lang="en-US" dirty="0"/>
+              <a:t>Cross-Platform (Including Windows)</a:t>
+            </a:r>
+          </a:p>
+        </p:txBody>
+      </p:sp>
+    </p:spTree>
+    <p:extLst>
+      <p:ext uri="{BB962C8B-B14F-4D97-AF65-F5344CB8AC3E}">
+        <p14:creationId xmlns:p14="http://schemas.microsoft.com/office/powerpoint/2010/main" val="2847865641"/>
+      </p:ext>
+    </p:extLst>
+  </p:cSld>
+  <p:clrMapOvr>
+    <a:masterClrMapping/>
+  </p:clrMapOvr>
+</p:sld>
+</file>
+
+<file path=ppt/slides/slide21.xml><?xml version="1.0" encoding="utf-8"?>
+<p:sld xmlns:a="http://schemas.openxmlformats.org/drawingml/2006/main" xmlns:r="http://schemas.openxmlformats.org/officeDocument/2006/relationships" xmlns:p="http://schemas.openxmlformats.org/presentationml/2006/main">
+  <p:cSld>
+    <p:spTree>
+      <p:nvGrpSpPr>
+        <p:cNvPr id="1" name=""/>
+        <p:cNvGrpSpPr/>
+        <p:nvPr/>
+      </p:nvGrpSpPr>
+      <p:grpSpPr>
+        <a:xfrm>
+          <a:off x="0" y="0"/>
+          <a:ext cx="0" cy="0"/>
+          <a:chOff x="0" y="0"/>
+          <a:chExt cx="0" cy="0"/>
+        </a:xfrm>
+      </p:grpSpPr>
+      <p:sp>
+        <p:nvSpPr>
+          <p:cNvPr id="4" name="Title 3">
+            <a:extLst>
+              <a:ext uri="{FF2B5EF4-FFF2-40B4-BE49-F238E27FC236}">
+                <a16:creationId xmlns:a16="http://schemas.microsoft.com/office/drawing/2014/main" id="{453B0534-F4C1-4A35-ABC0-61A9FFC4A17C}"/>
+              </a:ext>
+            </a:extLst>
+          </p:cNvPr>
+          <p:cNvSpPr>
+            <a:spLocks noGrp="1"/>
+          </p:cNvSpPr>
+          <p:nvPr>
+            <p:ph type="title"/>
+          </p:nvPr>
+        </p:nvSpPr>
+        <p:spPr/>
+        <p:txBody>
+          <a:bodyPr/>
+          <a:lstStyle/>
+          <a:p>
+            <a:r>
+              <a:rPr lang="en-US" dirty="0"/>
+              <a:t>.NET</a:t>
+            </a:r>
+          </a:p>
+        </p:txBody>
+      </p:sp>
+      <p:sp>
+        <p:nvSpPr>
+          <p:cNvPr id="5" name="Text Placeholder 4">
+            <a:extLst>
+              <a:ext uri="{FF2B5EF4-FFF2-40B4-BE49-F238E27FC236}">
+                <a16:creationId xmlns:a16="http://schemas.microsoft.com/office/drawing/2014/main" id="{61A0B68E-8604-485D-A07E-6B294211A5E8}"/>
+              </a:ext>
+            </a:extLst>
+          </p:cNvPr>
+          <p:cNvSpPr>
+            <a:spLocks noGrp="1"/>
+          </p:cNvSpPr>
+          <p:nvPr>
+            <p:ph type="body" idx="1"/>
+          </p:nvPr>
+        </p:nvSpPr>
+        <p:spPr/>
+        <p:txBody>
+          <a:bodyPr/>
+          <a:lstStyle/>
+          <a:p>
+            <a:r>
+              <a:rPr lang="en-US" dirty="0"/>
+              <a:t>Fishing for scripts</a:t>
+            </a:r>
+          </a:p>
+        </p:txBody>
+      </p:sp>
+    </p:spTree>
+    <p:extLst>
+      <p:ext uri="{BB962C8B-B14F-4D97-AF65-F5344CB8AC3E}">
+        <p14:creationId xmlns:p14="http://schemas.microsoft.com/office/powerpoint/2010/main" val="994814657"/>
+      </p:ext>
+    </p:extLst>
+  </p:cSld>
+  <p:clrMapOvr>
+    <a:masterClrMapping/>
+  </p:clrMapOvr>
+</p:sld>
+</file>
+
+<file path=ppt/slides/slide22.xml><?xml version="1.0" encoding="utf-8"?>
+<p:sld xmlns:a="http://schemas.openxmlformats.org/drawingml/2006/main" xmlns:r="http://schemas.openxmlformats.org/officeDocument/2006/relationships" xmlns:p="http://schemas.openxmlformats.org/presentationml/2006/main">
+  <p:cSld>
+    <p:spTree>
+      <p:nvGrpSpPr>
+        <p:cNvPr id="1" name=""/>
+        <p:cNvGrpSpPr/>
+        <p:nvPr/>
+      </p:nvGrpSpPr>
+      <p:grpSpPr>
+        <a:xfrm>
+          <a:off x="0" y="0"/>
+          <a:ext cx="0" cy="0"/>
+          <a:chOff x="0" y="0"/>
+          <a:chExt cx="0" cy="0"/>
+        </a:xfrm>
+      </p:grpSpPr>
+      <p:sp>
+        <p:nvSpPr>
+          <p:cNvPr id="2" name="Title 1">
+            <a:extLst>
+              <a:ext uri="{FF2B5EF4-FFF2-40B4-BE49-F238E27FC236}">
+                <a16:creationId xmlns:a16="http://schemas.microsoft.com/office/drawing/2014/main" id="{68E982BE-BD12-477A-BF79-27B68B7A382C}"/>
+              </a:ext>
+            </a:extLst>
+          </p:cNvPr>
+          <p:cNvSpPr>
+            <a:spLocks noGrp="1"/>
+          </p:cNvSpPr>
+          <p:nvPr>
+            <p:ph type="title"/>
+          </p:nvPr>
+        </p:nvSpPr>
+        <p:spPr/>
+        <p:txBody>
+          <a:bodyPr/>
+          <a:lstStyle/>
+          <a:p>
+            <a:r>
+              <a:rPr lang="en-US" dirty="0"/>
+              <a:t>Core Workout</a:t>
+            </a:r>
+          </a:p>
+        </p:txBody>
+      </p:sp>
+      <p:sp>
+        <p:nvSpPr>
+          <p:cNvPr id="3" name="Content Placeholder 2">
+            <a:extLst>
+              <a:ext uri="{FF2B5EF4-FFF2-40B4-BE49-F238E27FC236}">
+                <a16:creationId xmlns:a16="http://schemas.microsoft.com/office/drawing/2014/main" id="{B9D04904-BE45-4835-8899-7EA488995C1F}"/>
+              </a:ext>
+            </a:extLst>
+          </p:cNvPr>
+          <p:cNvSpPr>
+            <a:spLocks noGrp="1"/>
+          </p:cNvSpPr>
+          <p:nvPr>
+            <p:ph idx="1"/>
+          </p:nvPr>
+        </p:nvSpPr>
+        <p:spPr/>
+        <p:txBody>
+          <a:bodyPr/>
+          <a:lstStyle/>
+          <a:p>
+            <a:r>
+              <a:rPr lang="en-US" dirty="0"/>
+              <a:t>PowerShell 7 is the bees knees!</a:t>
+            </a:r>
+          </a:p>
+          <a:p>
+            <a:r>
+              <a:rPr lang="en-US" dirty="0"/>
+              <a:t>Improved modules</a:t>
+            </a:r>
+          </a:p>
+          <a:p>
+            <a:r>
+              <a:rPr lang="en-US" dirty="0"/>
+              <a:t>Support for almost all Windows PowerShell modules</a:t>
+            </a:r>
+          </a:p>
+          <a:p>
+            <a:r>
+              <a:rPr lang="en-US" dirty="0"/>
+              <a:t>Some nuances with legacy modules</a:t>
+            </a:r>
+          </a:p>
+          <a:p>
+            <a:r>
+              <a:rPr lang="en-US" dirty="0"/>
+              <a:t>Faster?</a:t>
+            </a:r>
+          </a:p>
+          <a:p>
+            <a:r>
+              <a:rPr lang="en-US" dirty="0"/>
+              <a:t>More Colorful?</a:t>
+            </a:r>
+          </a:p>
+          <a:p>
+            <a:r>
+              <a:rPr lang="en-US" dirty="0"/>
+              <a:t>Not perfect for every situation</a:t>
+            </a:r>
+          </a:p>
+        </p:txBody>
+      </p:sp>
+    </p:spTree>
+    <p:extLst>
+      <p:ext uri="{BB962C8B-B14F-4D97-AF65-F5344CB8AC3E}">
+        <p14:creationId xmlns:p14="http://schemas.microsoft.com/office/powerpoint/2010/main" val="661869269"/>
+      </p:ext>
+    </p:extLst>
+  </p:cSld>
+  <p:clrMapOvr>
+    <a:masterClrMapping/>
+  </p:clrMapOvr>
+</p:sld>
+</file>
+
+<file path=ppt/slides/slide23.xml><?xml version="1.0" encoding="utf-8"?>
+<p:sld xmlns:a="http://schemas.openxmlformats.org/drawingml/2006/main" xmlns:r="http://schemas.openxmlformats.org/officeDocument/2006/relationships" xmlns:p="http://schemas.openxmlformats.org/presentationml/2006/main">
+  <p:cSld>
+    <p:spTree>
+      <p:nvGrpSpPr>
+        <p:cNvPr id="1" name=""/>
+        <p:cNvGrpSpPr/>
+        <p:nvPr/>
+      </p:nvGrpSpPr>
+      <p:grpSpPr>
+        <a:xfrm>
+          <a:off x="0" y="0"/>
+          <a:ext cx="0" cy="0"/>
+          <a:chOff x="0" y="0"/>
+          <a:chExt cx="0" cy="0"/>
+        </a:xfrm>
+      </p:grpSpPr>
+      <p:sp>
+        <p:nvSpPr>
+          <p:cNvPr id="4" name="Title 3">
+            <a:extLst>
+              <a:ext uri="{FF2B5EF4-FFF2-40B4-BE49-F238E27FC236}">
+                <a16:creationId xmlns:a16="http://schemas.microsoft.com/office/drawing/2014/main" id="{1E59359C-B515-46FE-912B-9B9E583ACC6F}"/>
+              </a:ext>
+            </a:extLst>
+          </p:cNvPr>
+          <p:cNvSpPr>
+            <a:spLocks noGrp="1"/>
+          </p:cNvSpPr>
+          <p:nvPr>
+            <p:ph type="title"/>
+          </p:nvPr>
+        </p:nvSpPr>
+        <p:spPr/>
+        <p:txBody>
+          <a:bodyPr/>
+          <a:lstStyle/>
+          <a:p>
+            <a:r>
+              <a:rPr lang="en-US" dirty="0"/>
+              <a:t>PowerShell 7</a:t>
+            </a:r>
+          </a:p>
+        </p:txBody>
+      </p:sp>
+      <p:sp>
+        <p:nvSpPr>
+          <p:cNvPr id="5" name="Text Placeholder 4">
+            <a:extLst>
+              <a:ext uri="{FF2B5EF4-FFF2-40B4-BE49-F238E27FC236}">
+                <a16:creationId xmlns:a16="http://schemas.microsoft.com/office/drawing/2014/main" id="{2E8EC464-D977-42A6-8022-BBFB1EE02C73}"/>
+              </a:ext>
+            </a:extLst>
+          </p:cNvPr>
+          <p:cNvSpPr>
+            <a:spLocks noGrp="1"/>
+          </p:cNvSpPr>
+          <p:nvPr>
+            <p:ph type="body" idx="1"/>
+          </p:nvPr>
+        </p:nvSpPr>
+        <p:spPr/>
+        <p:txBody>
+          <a:bodyPr/>
+          <a:lstStyle/>
+          <a:p>
+            <a:r>
+              <a:rPr lang="en-US" dirty="0"/>
+              <a:t>What do we get out of it?</a:t>
+            </a:r>
+          </a:p>
+        </p:txBody>
+      </p:sp>
+    </p:spTree>
+    <p:extLst>
+      <p:ext uri="{BB962C8B-B14F-4D97-AF65-F5344CB8AC3E}">
+        <p14:creationId xmlns:p14="http://schemas.microsoft.com/office/powerpoint/2010/main" val="3448033158"/>
+      </p:ext>
+    </p:extLst>
+  </p:cSld>
+  <p:clrMapOvr>
+    <a:masterClrMapping/>
+  </p:clrMapOvr>
+</p:sld>
+</file>
+
+<file path=ppt/slides/slide24.xml><?xml version="1.0" encoding="utf-8"?>
+<p:sld xmlns:a="http://schemas.openxmlformats.org/drawingml/2006/main" xmlns:r="http://schemas.openxmlformats.org/officeDocument/2006/relationships" xmlns:p="http://schemas.openxmlformats.org/presentationml/2006/main">
+  <p:cSld>
+    <p:spTree>
+      <p:nvGrpSpPr>
+        <p:cNvPr id="1" name=""/>
+        <p:cNvGrpSpPr/>
+        <p:nvPr/>
+      </p:nvGrpSpPr>
+      <p:grpSpPr>
+        <a:xfrm>
+          <a:off x="0" y="0"/>
+          <a:ext cx="0" cy="0"/>
+          <a:chOff x="0" y="0"/>
+          <a:chExt cx="0" cy="0"/>
+        </a:xfrm>
+      </p:grpSpPr>
+      <p:sp>
+        <p:nvSpPr>
           <p:cNvPr id="4" name="Title 3">
             <a:extLst>
               <a:ext uri="{FF2B5EF4-FFF2-40B4-BE49-F238E27FC236}">
@@ -7131,7 +7723,7 @@
 </p:sld>
 </file>
 
-<file path=ppt/slides/slide21.xml><?xml version="1.0" encoding="utf-8"?>
+<file path=ppt/slides/slide25.xml><?xml version="1.0" encoding="utf-8"?>
 <p:sld xmlns:a="http://schemas.openxmlformats.org/drawingml/2006/main" xmlns:r="http://schemas.openxmlformats.org/officeDocument/2006/relationships" xmlns:p="http://schemas.openxmlformats.org/presentationml/2006/main">
   <p:cSld>
     <p:spTree>
@@ -7161,7 +7753,7 @@
 </p:sld>
 </file>
 
-<file path=ppt/slides/slide22.xml><?xml version="1.0" encoding="utf-8"?>
+<file path=ppt/slides/slide26.xml><?xml version="1.0" encoding="utf-8"?>
 <p:sld xmlns:a="http://schemas.openxmlformats.org/drawingml/2006/main" xmlns:r="http://schemas.openxmlformats.org/officeDocument/2006/relationships" xmlns:p="http://schemas.openxmlformats.org/presentationml/2006/main">
   <p:cSld>
     <p:spTree>
@@ -7423,10 +8015,10 @@
       </p:grpSpPr>
       <p:sp>
         <p:nvSpPr>
-          <p:cNvPr id="2" name="Title 1">
-            <a:extLst>
-              <a:ext uri="{FF2B5EF4-FFF2-40B4-BE49-F238E27FC236}">
-                <a16:creationId xmlns:a16="http://schemas.microsoft.com/office/drawing/2014/main" id="{FB6580B6-278D-46C5-BAA1-F3294A282DC7}"/>
+          <p:cNvPr id="4" name="Title 3">
+            <a:extLst>
+              <a:ext uri="{FF2B5EF4-FFF2-40B4-BE49-F238E27FC236}">
+                <a16:creationId xmlns:a16="http://schemas.microsoft.com/office/drawing/2014/main" id="{2FD73D28-962F-8E43-5907-544A140D2750}"/>
               </a:ext>
             </a:extLst>
           </p:cNvPr>
@@ -7444,17 +8036,17 @@
           <a:p>
             <a:r>
               <a:rPr lang="en-US" dirty="0"/>
-              <a:t>Classes</a:t>
+              <a:t>Let’s Get Started</a:t>
             </a:r>
           </a:p>
         </p:txBody>
       </p:sp>
       <p:sp>
         <p:nvSpPr>
-          <p:cNvPr id="3" name="Content Placeholder 2">
-            <a:extLst>
-              <a:ext uri="{FF2B5EF4-FFF2-40B4-BE49-F238E27FC236}">
-                <a16:creationId xmlns:a16="http://schemas.microsoft.com/office/drawing/2014/main" id="{66DD4736-B457-4813-972F-972A6C8D0318}"/>
+          <p:cNvPr id="5" name="Text Placeholder 4">
+            <a:extLst>
+              <a:ext uri="{FF2B5EF4-FFF2-40B4-BE49-F238E27FC236}">
+                <a16:creationId xmlns:a16="http://schemas.microsoft.com/office/drawing/2014/main" id="{3B30A130-0D00-7790-26E9-044787E6435F}"/>
               </a:ext>
             </a:extLst>
           </p:cNvPr>
@@ -7462,7 +8054,7 @@
             <a:spLocks noGrp="1"/>
           </p:cNvSpPr>
           <p:nvPr>
-            <p:ph idx="1"/>
+            <p:ph type="body" idx="1"/>
           </p:nvPr>
         </p:nvSpPr>
         <p:spPr/>
@@ -7472,25 +8064,28 @@
           <a:p>
             <a:r>
               <a:rPr lang="en-US" dirty="0"/>
-              <a:t>Foundation of all objects in PowerShell (and programming)</a:t>
-            </a:r>
-          </a:p>
-          <a:p>
-            <a:r>
-              <a:rPr lang="en-US" dirty="0"/>
-              <a:t>Structured object with a definition</a:t>
-            </a:r>
-          </a:p>
-          <a:p>
-            <a:r>
-              <a:rPr lang="en-US" dirty="0"/>
-              <a:t>Supports Properties and Methods</a:t>
-            </a:r>
-          </a:p>
-          <a:p>
-            <a:r>
-              <a:rPr lang="en-US" dirty="0"/>
-              <a:t>Foundation</a:t>
+              <a:t>Prepare for Brain Overload.</a:t>
+            </a:r>
+            <a:br>
+              <a:rPr lang="en-US" dirty="0"/>
+            </a:br>
+            <a:r>
+              <a:rPr lang="en-US" dirty="0"/>
+              <a:t>Download PowerPoint.</a:t>
+            </a:r>
+            <a:br>
+              <a:rPr lang="en-US" dirty="0"/>
+            </a:br>
+            <a:r>
+              <a:rPr lang="en-US" dirty="0"/>
+              <a:t>Review again later.</a:t>
+            </a:r>
+            <a:br>
+              <a:rPr lang="en-US" dirty="0"/>
+            </a:br>
+            <a:r>
+              <a:rPr lang="en-US" dirty="0"/>
+              <a:t>Ask us questions when you see us.</a:t>
             </a:r>
           </a:p>
         </p:txBody>
@@ -7498,7 +8093,7 @@
     </p:spTree>
     <p:extLst>
       <p:ext uri="{BB962C8B-B14F-4D97-AF65-F5344CB8AC3E}">
-        <p14:creationId xmlns:p14="http://schemas.microsoft.com/office/powerpoint/2010/main" val="2539682485"/>
+        <p14:creationId xmlns:p14="http://schemas.microsoft.com/office/powerpoint/2010/main" val="2198709616"/>
       </p:ext>
     </p:extLst>
   </p:cSld>
@@ -7527,10 +8122,10 @@
       </p:grpSpPr>
       <p:sp>
         <p:nvSpPr>
-          <p:cNvPr id="4" name="Title 3">
-            <a:extLst>
-              <a:ext uri="{FF2B5EF4-FFF2-40B4-BE49-F238E27FC236}">
-                <a16:creationId xmlns:a16="http://schemas.microsoft.com/office/drawing/2014/main" id="{526BC2B6-AE2C-3E1D-788D-592ABCDC14E7}"/>
+          <p:cNvPr id="2" name="Title 1">
+            <a:extLst>
+              <a:ext uri="{FF2B5EF4-FFF2-40B4-BE49-F238E27FC236}">
+                <a16:creationId xmlns:a16="http://schemas.microsoft.com/office/drawing/2014/main" id="{FB6580B6-278D-46C5-BAA1-F3294A282DC7}"/>
               </a:ext>
             </a:extLst>
           </p:cNvPr>
@@ -7555,10 +8150,10 @@
       </p:sp>
       <p:sp>
         <p:nvSpPr>
-          <p:cNvPr id="5" name="Text Placeholder 4">
-            <a:extLst>
-              <a:ext uri="{FF2B5EF4-FFF2-40B4-BE49-F238E27FC236}">
-                <a16:creationId xmlns:a16="http://schemas.microsoft.com/office/drawing/2014/main" id="{CE5050AF-7D60-7B16-0E17-6467A67E504A}"/>
+          <p:cNvPr id="3" name="Content Placeholder 2">
+            <a:extLst>
+              <a:ext uri="{FF2B5EF4-FFF2-40B4-BE49-F238E27FC236}">
+                <a16:creationId xmlns:a16="http://schemas.microsoft.com/office/drawing/2014/main" id="{66DD4736-B457-4813-972F-972A6C8D0318}"/>
               </a:ext>
             </a:extLst>
           </p:cNvPr>
@@ -7566,7 +8161,7 @@
             <a:spLocks noGrp="1"/>
           </p:cNvSpPr>
           <p:nvPr>
-            <p:ph type="body" idx="1"/>
+            <p:ph idx="1"/>
           </p:nvPr>
         </p:nvSpPr>
         <p:spPr/>
@@ -7576,23 +8171,53 @@
           <a:p>
             <a:r>
               <a:rPr lang="en-US" dirty="0"/>
-              <a:t>Practical </a:t>
-            </a:r>
+              <a:t>A fundamental concept in Object-Oriented Programming</a:t>
+            </a:r>
+          </a:p>
+          <a:p>
+            <a:r>
+              <a:rPr lang="en-US" dirty="0"/>
+              <a:t>The foundation of all objects in PowerShell </a:t>
+            </a:r>
+          </a:p>
+          <a:p>
+            <a:r>
+              <a:rPr lang="en-US" dirty="0"/>
+              <a:t>They’re like object blueprints</a:t>
+            </a:r>
+          </a:p>
+          <a:p>
             <a:r>
               <a:rPr lang="en-US" dirty="0" err="1"/>
-              <a:t>Exmaples</a:t>
-            </a:r>
-            <a:r>
-              <a:rPr lang="en-US" dirty="0"/>
-              <a:t>…  maybe</a:t>
-            </a:r>
+              <a:t>PSCustomObject</a:t>
+            </a:r>
+            <a:r>
+              <a:rPr lang="en-US" dirty="0"/>
+              <a:t> is baby stepping into this world…</a:t>
+            </a:r>
+          </a:p>
+          <a:p>
+            <a:pPr lvl="1"/>
+            <a:r>
+              <a:rPr lang="en-US"/>
+              <a:t>Also, </a:t>
+            </a:r>
+            <a:r>
+              <a:rPr lang="en-US" dirty="0"/>
+              <a:t>more complicated when you do more </a:t>
+            </a:r>
+            <a:r>
+              <a:rPr lang="en-US"/>
+              <a:t>advanced things…</a:t>
+            </a:r>
+            <a:endParaRPr lang="en-US" dirty="0"/>
           </a:p>
         </p:txBody>
       </p:sp>
     </p:spTree>
     <p:extLst>
       <p:ext uri="{BB962C8B-B14F-4D97-AF65-F5344CB8AC3E}">
-        <p14:creationId xmlns:p14="http://schemas.microsoft.com/office/powerpoint/2010/main" val="2998567692"/>
+        <p14:creationId xmlns:p14="http://schemas.microsoft.com/office/powerpoint/2010/main" val="2539682485"/>
       </p:ext>
     </p:extLst>
   </p:cSld>
@@ -7621,10 +8246,10 @@
       </p:grpSpPr>
       <p:sp>
         <p:nvSpPr>
-          <p:cNvPr id="4" name="Title 3">
-            <a:extLst>
-              <a:ext uri="{FF2B5EF4-FFF2-40B4-BE49-F238E27FC236}">
-                <a16:creationId xmlns:a16="http://schemas.microsoft.com/office/drawing/2014/main" id="{61C903EF-C4AE-4B02-BB88-7589883ED3B8}"/>
+          <p:cNvPr id="2" name="Title 1">
+            <a:extLst>
+              <a:ext uri="{FF2B5EF4-FFF2-40B4-BE49-F238E27FC236}">
+                <a16:creationId xmlns:a16="http://schemas.microsoft.com/office/drawing/2014/main" id="{FB6580B6-278D-46C5-BAA1-F3294A282DC7}"/>
               </a:ext>
             </a:extLst>
           </p:cNvPr>
@@ -7642,17 +8267,17 @@
           <a:p>
             <a:r>
               <a:rPr lang="en-US" dirty="0"/>
-              <a:t>Functions</a:t>
+              <a:t>Classes</a:t>
             </a:r>
           </a:p>
         </p:txBody>
       </p:sp>
       <p:sp>
         <p:nvSpPr>
-          <p:cNvPr id="5" name="Content Placeholder 4">
-            <a:extLst>
-              <a:ext uri="{FF2B5EF4-FFF2-40B4-BE49-F238E27FC236}">
-                <a16:creationId xmlns:a16="http://schemas.microsoft.com/office/drawing/2014/main" id="{BF1CF2CE-BE28-4F3F-9486-D9627B4A5BDB}"/>
+          <p:cNvPr id="3" name="Content Placeholder 2">
+            <a:extLst>
+              <a:ext uri="{FF2B5EF4-FFF2-40B4-BE49-F238E27FC236}">
+                <a16:creationId xmlns:a16="http://schemas.microsoft.com/office/drawing/2014/main" id="{66DD4736-B457-4813-972F-972A6C8D0318}"/>
               </a:ext>
             </a:extLst>
           </p:cNvPr>
@@ -7670,43 +8295,193 @@
           <a:p>
             <a:r>
               <a:rPr lang="en-US" dirty="0"/>
-              <a:t>Functions are like cmdlets that you define in your code</a:t>
-            </a:r>
-          </a:p>
-          <a:p>
-            <a:r>
-              <a:rPr lang="en-US" dirty="0"/>
-              <a:t>Can be part of a script, module, or session</a:t>
-            </a:r>
-          </a:p>
-          <a:p>
-            <a:r>
-              <a:rPr lang="en-US" dirty="0"/>
-              <a:t>May or may not return an object</a:t>
-            </a:r>
-          </a:p>
-          <a:p>
-            <a:r>
-              <a:rPr lang="en-US" dirty="0"/>
-              <a:t>Great for repetitive code blocks</a:t>
-            </a:r>
-          </a:p>
-          <a:p>
-            <a:r>
-              <a:rPr lang="en-US" dirty="0"/>
-              <a:t>Can reduce memory pressure in some situation, add to it in others</a:t>
-            </a:r>
-          </a:p>
-          <a:p>
-            <a:r>
-              <a:rPr lang="en-US" dirty="0"/>
-              <a:t>Can reduce speed in some situations</a:t>
-            </a:r>
-          </a:p>
-          <a:p>
-            <a:r>
-              <a:rPr lang="en-US" dirty="0"/>
-              <a:t>Allows one to make use of the pipeline</a:t>
+              <a:t>Basic classes will likely have:</a:t>
+            </a:r>
+          </a:p>
+          <a:p>
+            <a:pPr lvl="1"/>
+            <a:r>
+              <a:rPr lang="en-US" dirty="0"/>
+              <a:t>Properties: A </a:t>
+            </a:r>
+            <a:r>
+              <a:rPr kumimoji="0" lang="en-US" sz="2200" b="0" i="0" u="none" strike="noStrike" kern="1200" cap="none" spc="0" normalizeH="0" baseline="0" noProof="0" dirty="0">
+                <a:ln>
+                  <a:noFill/>
+                </a:ln>
+                <a:solidFill>
+                  <a:schemeClr val="accent1">
+                    <a:lumMod val="60000"/>
+                    <a:lumOff val="40000"/>
+                  </a:schemeClr>
+                </a:solidFill>
+                <a:effectLst/>
+                <a:uLnTx/>
+                <a:uFillTx/>
+                <a:latin typeface="Consolas" panose="020B0609020204030204" pitchFamily="49" charset="0"/>
+                <a:ea typeface="+mn-ea"/>
+                <a:cs typeface="+mn-cs"/>
+              </a:rPr>
+              <a:t>Person</a:t>
+            </a:r>
+            <a:r>
+              <a:rPr lang="en-US" dirty="0"/>
+              <a:t> has a </a:t>
+            </a:r>
+            <a:r>
+              <a:rPr kumimoji="0" lang="en-US" sz="2200" b="0" i="0" u="none" strike="noStrike" kern="1200" cap="none" spc="0" normalizeH="0" baseline="0" noProof="0" dirty="0">
+                <a:ln>
+                  <a:noFill/>
+                </a:ln>
+                <a:solidFill>
+                  <a:schemeClr val="accent1">
+                    <a:lumMod val="60000"/>
+                    <a:lumOff val="40000"/>
+                  </a:schemeClr>
+                </a:solidFill>
+                <a:effectLst/>
+                <a:uLnTx/>
+                <a:uFillTx/>
+                <a:latin typeface="Consolas" panose="020B0609020204030204" pitchFamily="49" charset="0"/>
+                <a:ea typeface="+mn-ea"/>
+                <a:cs typeface="+mn-cs"/>
+              </a:rPr>
+              <a:t>Name</a:t>
+            </a:r>
+            <a:endParaRPr lang="en-US" dirty="0"/>
+          </a:p>
+          <a:p>
+            <a:pPr lvl="1"/>
+            <a:r>
+              <a:rPr lang="en-US" dirty="0"/>
+              <a:t>Methods: A </a:t>
+            </a:r>
+            <a:r>
+              <a:rPr kumimoji="0" lang="en-US" sz="2200" b="0" i="0" u="none" strike="noStrike" kern="1200" cap="none" spc="0" normalizeH="0" baseline="0" noProof="0" dirty="0">
+                <a:ln>
+                  <a:noFill/>
+                </a:ln>
+                <a:solidFill>
+                  <a:schemeClr val="accent1">
+                    <a:lumMod val="60000"/>
+                    <a:lumOff val="40000"/>
+                  </a:schemeClr>
+                </a:solidFill>
+                <a:effectLst/>
+                <a:uLnTx/>
+                <a:uFillTx/>
+                <a:latin typeface="Consolas" panose="020B0609020204030204" pitchFamily="49" charset="0"/>
+                <a:ea typeface="+mn-ea"/>
+                <a:cs typeface="+mn-cs"/>
+              </a:rPr>
+              <a:t>Person</a:t>
+            </a:r>
+            <a:r>
+              <a:rPr lang="en-US" dirty="0"/>
+              <a:t> can </a:t>
+            </a:r>
+            <a:r>
+              <a:rPr lang="en-US" sz="2200" dirty="0">
+                <a:solidFill>
+                  <a:schemeClr val="accent1">
+                    <a:lumMod val="60000"/>
+                    <a:lumOff val="40000"/>
+                  </a:schemeClr>
+                </a:solidFill>
+                <a:latin typeface="Consolas" panose="020B0609020204030204" pitchFamily="49" charset="0"/>
+              </a:rPr>
+              <a:t>Say</a:t>
+            </a:r>
+            <a:r>
+              <a:rPr lang="en-US" sz="2000" dirty="0">
+                <a:solidFill>
+                  <a:schemeClr val="accent1">
+                    <a:lumMod val="60000"/>
+                    <a:lumOff val="40000"/>
+                  </a:schemeClr>
+                </a:solidFill>
+                <a:latin typeface="Consolas" panose="020B0609020204030204" pitchFamily="49" charset="0"/>
+              </a:rPr>
+              <a:t> </a:t>
+            </a:r>
+            <a:r>
+              <a:rPr lang="en-US" sz="2200" dirty="0">
+                <a:solidFill>
+                  <a:schemeClr val="accent1">
+                    <a:lumMod val="60000"/>
+                    <a:lumOff val="40000"/>
+                  </a:schemeClr>
+                </a:solidFill>
+                <a:latin typeface="Consolas" panose="020B0609020204030204" pitchFamily="49" charset="0"/>
+              </a:rPr>
+              <a:t>Hello</a:t>
+            </a:r>
+            <a:endParaRPr lang="en-US" sz="2200" dirty="0">
+              <a:solidFill>
+                <a:schemeClr val="accent1">
+                  <a:lumMod val="60000"/>
+                  <a:lumOff val="40000"/>
+                </a:schemeClr>
+              </a:solidFill>
+            </a:endParaRPr>
+          </a:p>
+          <a:p>
+            <a:pPr lvl="1"/>
+            <a:r>
+              <a:rPr lang="en-US" dirty="0"/>
+              <a:t>Constructors: You can </a:t>
+            </a:r>
+            <a:r>
+              <a:rPr kumimoji="0" lang="en-US" sz="2200" b="0" i="0" u="none" strike="noStrike" kern="1200" cap="none" spc="0" normalizeH="0" baseline="0" noProof="0" dirty="0">
+                <a:ln>
+                  <a:noFill/>
+                </a:ln>
+                <a:solidFill>
+                  <a:srgbClr val="FF0000">
+                    <a:lumMod val="60000"/>
+                    <a:lumOff val="40000"/>
+                  </a:srgbClr>
+                </a:solidFill>
+                <a:effectLst/>
+                <a:uLnTx/>
+                <a:uFillTx/>
+                <a:latin typeface="Consolas" panose="020B0609020204030204" pitchFamily="49" charset="0"/>
+                <a:ea typeface="+mn-ea"/>
+                <a:cs typeface="+mn-cs"/>
+              </a:rPr>
+              <a:t>Name</a:t>
+            </a:r>
+            <a:r>
+              <a:rPr lang="en-US" dirty="0"/>
+              <a:t> a </a:t>
+            </a:r>
+            <a:r>
+              <a:rPr kumimoji="0" lang="en-US" sz="2200" b="0" i="0" u="none" strike="noStrike" kern="1200" cap="none" spc="0" normalizeH="0" baseline="0" noProof="0" dirty="0">
+                <a:ln>
+                  <a:noFill/>
+                </a:ln>
+                <a:solidFill>
+                  <a:srgbClr val="FF0000">
+                    <a:lumMod val="60000"/>
+                    <a:lumOff val="40000"/>
+                  </a:srgbClr>
+                </a:solidFill>
+                <a:effectLst/>
+                <a:uLnTx/>
+                <a:uFillTx/>
+                <a:latin typeface="Consolas" panose="020B0609020204030204" pitchFamily="49" charset="0"/>
+                <a:ea typeface="+mn-ea"/>
+                <a:cs typeface="+mn-cs"/>
+              </a:rPr>
+              <a:t>Person</a:t>
+            </a:r>
+            <a:r>
+              <a:rPr lang="en-US" dirty="0"/>
+              <a:t> when they are </a:t>
+            </a:r>
+            <a:r>
+              <a:rPr lang="en-US" i="1" dirty="0"/>
+              <a:t>created</a:t>
             </a:r>
           </a:p>
         </p:txBody>
@@ -7714,7 +8489,7 @@
     </p:spTree>
     <p:extLst>
       <p:ext uri="{BB962C8B-B14F-4D97-AF65-F5344CB8AC3E}">
-        <p14:creationId xmlns:p14="http://schemas.microsoft.com/office/powerpoint/2010/main" val="3244135314"/>
+        <p14:creationId xmlns:p14="http://schemas.microsoft.com/office/powerpoint/2010/main" val="2425690725"/>
       </p:ext>
     </p:extLst>
   </p:cSld>
@@ -7746,7 +8521,7 @@
           <p:cNvPr id="2" name="Title 1">
             <a:extLst>
               <a:ext uri="{FF2B5EF4-FFF2-40B4-BE49-F238E27FC236}">
-                <a16:creationId xmlns:a16="http://schemas.microsoft.com/office/drawing/2014/main" id="{BD6D1BFA-BB4C-4595-859E-D2734B1F0873}"/>
+                <a16:creationId xmlns:a16="http://schemas.microsoft.com/office/drawing/2014/main" id="{FB6580B6-278D-46C5-BAA1-F3294A282DC7}"/>
               </a:ext>
             </a:extLst>
           </p:cNvPr>
@@ -7764,17 +8539,17 @@
           <a:p>
             <a:r>
               <a:rPr lang="en-US" dirty="0"/>
-              <a:t>Functions</a:t>
+              <a:t>Classes</a:t>
             </a:r>
           </a:p>
         </p:txBody>
       </p:sp>
       <p:sp>
         <p:nvSpPr>
-          <p:cNvPr id="3" name="Text Placeholder 2">
-            <a:extLst>
-              <a:ext uri="{FF2B5EF4-FFF2-40B4-BE49-F238E27FC236}">
-                <a16:creationId xmlns:a16="http://schemas.microsoft.com/office/drawing/2014/main" id="{D8B4B01B-F69D-42F5-BE9C-56FD1EFEF721}"/>
+          <p:cNvPr id="3" name="Content Placeholder 2">
+            <a:extLst>
+              <a:ext uri="{FF2B5EF4-FFF2-40B4-BE49-F238E27FC236}">
+                <a16:creationId xmlns:a16="http://schemas.microsoft.com/office/drawing/2014/main" id="{66DD4736-B457-4813-972F-972A6C8D0318}"/>
               </a:ext>
             </a:extLst>
           </p:cNvPr>
@@ -7782,17 +8557,401 @@
             <a:spLocks noGrp="1"/>
           </p:cNvSpPr>
           <p:nvPr>
-            <p:ph type="body" idx="1"/>
+            <p:ph idx="1"/>
           </p:nvPr>
         </p:nvSpPr>
-        <p:spPr/>
+        <p:spPr>
+          <a:xfrm>
+            <a:off x="838200" y="1507786"/>
+            <a:ext cx="10515600" cy="5134553"/>
+          </a:xfrm>
+        </p:spPr>
         <p:txBody>
           <a:bodyPr/>
           <a:lstStyle/>
           <a:p>
             <a:r>
               <a:rPr lang="en-US" dirty="0"/>
-              <a:t>Better than a school dance</a:t>
+              <a:t>Advanced classes can have:</a:t>
+            </a:r>
+          </a:p>
+          <a:p>
+            <a:pPr lvl="1"/>
+            <a:r>
+              <a:rPr lang="en-US" dirty="0"/>
+              <a:t>Hidden Attribute (Properties / Methods)</a:t>
+            </a:r>
+          </a:p>
+          <a:p>
+            <a:pPr lvl="2"/>
+            <a:r>
+              <a:rPr lang="en-US" dirty="0"/>
+              <a:t>A </a:t>
+            </a:r>
+            <a:r>
+              <a:rPr lang="en-US" sz="1800" dirty="0">
+                <a:solidFill>
+                  <a:schemeClr val="accent1">
+                    <a:lumMod val="60000"/>
+                    <a:lumOff val="40000"/>
+                  </a:schemeClr>
+                </a:solidFill>
+                <a:latin typeface="Consolas" panose="020B0609020204030204" pitchFamily="49" charset="0"/>
+              </a:rPr>
+              <a:t>Person</a:t>
+            </a:r>
+            <a:r>
+              <a:rPr lang="en-US" dirty="0"/>
+              <a:t> does not publicly share their </a:t>
+            </a:r>
+            <a:r>
+              <a:rPr lang="en-US" sz="1800" dirty="0">
+                <a:solidFill>
+                  <a:schemeClr val="accent1">
+                    <a:lumMod val="60000"/>
+                    <a:lumOff val="40000"/>
+                  </a:schemeClr>
+                </a:solidFill>
+                <a:latin typeface="Consolas" panose="020B0609020204030204" pitchFamily="49" charset="0"/>
+              </a:rPr>
+              <a:t>Browser History</a:t>
+            </a:r>
+            <a:endParaRPr lang="en-US" dirty="0">
+              <a:solidFill>
+                <a:schemeClr val="accent1">
+                  <a:lumMod val="60000"/>
+                  <a:lumOff val="40000"/>
+                </a:schemeClr>
+              </a:solidFill>
+              <a:latin typeface="Consolas" panose="020B0609020204030204" pitchFamily="49" charset="0"/>
+            </a:endParaRPr>
+          </a:p>
+          <a:p>
+            <a:pPr lvl="2"/>
+            <a:r>
+              <a:rPr lang="en-US" dirty="0"/>
+              <a:t>Note: NOT like “Private” in C#</a:t>
+            </a:r>
+          </a:p>
+          <a:p>
+            <a:pPr lvl="1"/>
+            <a:r>
+              <a:rPr lang="en-US" dirty="0"/>
+              <a:t>Static Attribute (Properties / Methods)</a:t>
+            </a:r>
+          </a:p>
+          <a:p>
+            <a:pPr lvl="2"/>
+            <a:r>
+              <a:rPr lang="en-US" dirty="0"/>
+              <a:t>All </a:t>
+            </a:r>
+            <a:r>
+              <a:rPr lang="en-US" sz="1800" dirty="0">
+                <a:solidFill>
+                  <a:schemeClr val="accent1">
+                    <a:lumMod val="60000"/>
+                    <a:lumOff val="40000"/>
+                  </a:schemeClr>
+                </a:solidFill>
+                <a:latin typeface="Consolas" panose="020B0609020204030204" pitchFamily="49" charset="0"/>
+              </a:rPr>
+              <a:t>Persons</a:t>
+            </a:r>
+            <a:r>
+              <a:rPr lang="en-US" dirty="0"/>
+              <a:t> (for now) were </a:t>
+            </a:r>
+            <a:r>
+              <a:rPr lang="en-US" sz="1800" dirty="0">
+                <a:solidFill>
+                  <a:schemeClr val="accent1">
+                    <a:lumMod val="60000"/>
+                    <a:lumOff val="40000"/>
+                  </a:schemeClr>
+                </a:solidFill>
+                <a:latin typeface="Consolas" panose="020B0609020204030204" pitchFamily="49" charset="0"/>
+              </a:rPr>
+              <a:t>Born</a:t>
+            </a:r>
+            <a:r>
+              <a:rPr lang="en-US" dirty="0"/>
+              <a:t> on </a:t>
+            </a:r>
+            <a:r>
+              <a:rPr lang="en-US" sz="1800" dirty="0">
+                <a:solidFill>
+                  <a:schemeClr val="accent1">
+                    <a:lumMod val="60000"/>
+                    <a:lumOff val="40000"/>
+                  </a:schemeClr>
+                </a:solidFill>
+                <a:latin typeface="Consolas" panose="020B0609020204030204" pitchFamily="49" charset="0"/>
+              </a:rPr>
+              <a:t>Planet Earth</a:t>
+            </a:r>
+            <a:endParaRPr lang="en-US" dirty="0">
+              <a:solidFill>
+                <a:schemeClr val="accent1">
+                  <a:lumMod val="60000"/>
+                  <a:lumOff val="40000"/>
+                </a:schemeClr>
+              </a:solidFill>
+              <a:latin typeface="Consolas" panose="020B0609020204030204" pitchFamily="49" charset="0"/>
+            </a:endParaRPr>
+          </a:p>
+          <a:p>
+            <a:pPr lvl="2"/>
+            <a:r>
+              <a:rPr lang="en-US" dirty="0"/>
+              <a:t>We could (theoretically) </a:t>
+            </a:r>
+            <a:r>
+              <a:rPr lang="en-US" sz="1800" dirty="0">
+                <a:solidFill>
+                  <a:schemeClr val="accent1">
+                    <a:lumMod val="60000"/>
+                    <a:lumOff val="40000"/>
+                  </a:schemeClr>
+                </a:solidFill>
+                <a:latin typeface="Consolas" panose="020B0609020204030204" pitchFamily="49" charset="0"/>
+              </a:rPr>
+              <a:t>list the names</a:t>
+            </a:r>
+            <a:r>
+              <a:rPr lang="en-US" dirty="0"/>
+              <a:t> of all </a:t>
+            </a:r>
+            <a:r>
+              <a:rPr lang="en-US" dirty="0">
+                <a:solidFill>
+                  <a:schemeClr val="accent1">
+                    <a:lumMod val="60000"/>
+                    <a:lumOff val="40000"/>
+                  </a:schemeClr>
+                </a:solidFill>
+              </a:rPr>
+              <a:t>Persons</a:t>
+            </a:r>
+            <a:r>
+              <a:rPr lang="en-US" dirty="0"/>
+              <a:t> who exist</a:t>
+            </a:r>
+          </a:p>
+          <a:p>
+            <a:pPr lvl="1"/>
+            <a:r>
+              <a:rPr lang="en-US" dirty="0"/>
+              <a:t>Inheritance</a:t>
+            </a:r>
+          </a:p>
+          <a:p>
+            <a:pPr lvl="2"/>
+            <a:r>
+              <a:rPr lang="en-US" dirty="0"/>
+              <a:t>Base Inheritance: A </a:t>
+            </a:r>
+            <a:r>
+              <a:rPr lang="en-US" sz="1800" dirty="0">
+                <a:solidFill>
+                  <a:schemeClr val="accent1">
+                    <a:lumMod val="60000"/>
+                    <a:lumOff val="40000"/>
+                  </a:schemeClr>
+                </a:solidFill>
+                <a:latin typeface="Consolas" panose="020B0609020204030204" pitchFamily="49" charset="0"/>
+              </a:rPr>
+              <a:t>Person</a:t>
+            </a:r>
+            <a:r>
+              <a:rPr lang="en-US" dirty="0"/>
+              <a:t> is a </a:t>
+            </a:r>
+            <a:r>
+              <a:rPr lang="en-US" sz="1800" dirty="0">
+                <a:solidFill>
+                  <a:schemeClr val="accent1">
+                    <a:lumMod val="60000"/>
+                    <a:lumOff val="40000"/>
+                  </a:schemeClr>
+                </a:solidFill>
+                <a:latin typeface="Consolas" panose="020B0609020204030204" pitchFamily="49" charset="0"/>
+              </a:rPr>
+              <a:t>Mammal</a:t>
+            </a:r>
+            <a:r>
+              <a:rPr lang="en-US" dirty="0"/>
+              <a:t>, and a </a:t>
+            </a:r>
+            <a:r>
+              <a:rPr lang="en-US" sz="1800" dirty="0">
+                <a:solidFill>
+                  <a:schemeClr val="accent1">
+                    <a:lumMod val="60000"/>
+                    <a:lumOff val="40000"/>
+                  </a:schemeClr>
+                </a:solidFill>
+                <a:latin typeface="Consolas" panose="020B0609020204030204" pitchFamily="49" charset="0"/>
+              </a:rPr>
+              <a:t>Child</a:t>
+            </a:r>
+            <a:r>
+              <a:rPr lang="en-US" dirty="0"/>
+              <a:t> is a </a:t>
+            </a:r>
+            <a:r>
+              <a:rPr lang="en-US" sz="1800" dirty="0">
+                <a:solidFill>
+                  <a:schemeClr val="accent1">
+                    <a:lumMod val="60000"/>
+                    <a:lumOff val="40000"/>
+                  </a:schemeClr>
+                </a:solidFill>
+                <a:latin typeface="Consolas" panose="020B0609020204030204" pitchFamily="49" charset="0"/>
+              </a:rPr>
+              <a:t>Person</a:t>
+            </a:r>
+            <a:endParaRPr lang="en-US" dirty="0">
+              <a:solidFill>
+                <a:schemeClr val="accent1">
+                  <a:lumMod val="60000"/>
+                  <a:lumOff val="40000"/>
+                </a:schemeClr>
+              </a:solidFill>
+              <a:latin typeface="Consolas" panose="020B0609020204030204" pitchFamily="49" charset="0"/>
+            </a:endParaRPr>
+          </a:p>
+          <a:p>
+            <a:pPr lvl="3"/>
+            <a:r>
+              <a:rPr lang="en-US" dirty="0"/>
+              <a:t>Inherits the properties/methods of its “parent”</a:t>
+            </a:r>
+          </a:p>
+          <a:p>
+            <a:pPr lvl="2"/>
+            <a:r>
+              <a:rPr lang="en-US" dirty="0"/>
+              <a:t>Interface Inheritance: A </a:t>
+            </a:r>
+            <a:r>
+              <a:rPr lang="en-US" sz="1800" dirty="0">
+                <a:solidFill>
+                  <a:schemeClr val="accent1">
+                    <a:lumMod val="60000"/>
+                    <a:lumOff val="40000"/>
+                  </a:schemeClr>
+                </a:solidFill>
+                <a:latin typeface="Consolas" panose="020B0609020204030204" pitchFamily="49" charset="0"/>
+              </a:rPr>
+              <a:t>Dog</a:t>
+            </a:r>
+            <a:r>
+              <a:rPr lang="en-US" dirty="0"/>
+              <a:t> or </a:t>
+            </a:r>
+            <a:r>
+              <a:rPr lang="en-US" sz="1800" dirty="0">
+                <a:solidFill>
+                  <a:schemeClr val="accent1">
+                    <a:lumMod val="60000"/>
+                    <a:lumOff val="40000"/>
+                  </a:schemeClr>
+                </a:solidFill>
+                <a:latin typeface="Consolas" panose="020B0609020204030204" pitchFamily="49" charset="0"/>
+              </a:rPr>
+              <a:t>Person</a:t>
+            </a:r>
+            <a:r>
+              <a:rPr lang="en-US" dirty="0"/>
+              <a:t> could </a:t>
+            </a:r>
+            <a:r>
+              <a:rPr lang="en-US" i="1" dirty="0"/>
+              <a:t>implement</a:t>
+            </a:r>
+            <a:r>
+              <a:rPr lang="en-US" dirty="0"/>
+              <a:t> </a:t>
+            </a:r>
+            <a:r>
+              <a:rPr lang="en-US" sz="1800" dirty="0">
+                <a:solidFill>
+                  <a:schemeClr val="accent1">
+                    <a:lumMod val="60000"/>
+                    <a:lumOff val="40000"/>
+                  </a:schemeClr>
+                </a:solidFill>
+                <a:latin typeface="Consolas" panose="020B0609020204030204" pitchFamily="49" charset="0"/>
+              </a:rPr>
+              <a:t>Acting</a:t>
+            </a:r>
+            <a:r>
+              <a:rPr lang="en-US" dirty="0"/>
+              <a:t> abilities</a:t>
+            </a:r>
+          </a:p>
+          <a:p>
+            <a:pPr lvl="3"/>
+            <a:r>
+              <a:rPr lang="en-US" dirty="0"/>
+              <a:t>An interface is like a contract – an “</a:t>
+            </a:r>
+            <a:r>
+              <a:rPr lang="en-US" dirty="0" err="1"/>
+              <a:t>IActor</a:t>
+            </a:r>
+            <a:r>
+              <a:rPr lang="en-US" dirty="0"/>
+              <a:t>” must be able to </a:t>
+            </a:r>
+            <a:r>
+              <a:rPr lang="en-US" sz="1600" dirty="0">
+                <a:solidFill>
+                  <a:schemeClr val="accent1">
+                    <a:lumMod val="60000"/>
+                    <a:lumOff val="40000"/>
+                  </a:schemeClr>
+                </a:solidFill>
+                <a:latin typeface="Consolas" panose="020B0609020204030204" pitchFamily="49" charset="0"/>
+              </a:rPr>
+              <a:t>Speak</a:t>
+            </a:r>
+            <a:r>
+              <a:rPr lang="en-US" dirty="0"/>
+              <a:t> - however, how a </a:t>
+            </a:r>
+            <a:r>
+              <a:rPr lang="en-US" sz="1600" dirty="0">
+                <a:solidFill>
+                  <a:schemeClr val="accent1">
+                    <a:lumMod val="60000"/>
+                    <a:lumOff val="40000"/>
+                  </a:schemeClr>
+                </a:solidFill>
+                <a:latin typeface="Consolas" panose="020B0609020204030204" pitchFamily="49" charset="0"/>
+              </a:rPr>
+              <a:t>Dog</a:t>
+            </a:r>
+            <a:r>
+              <a:rPr lang="en-US" dirty="0"/>
+              <a:t> speaks will be different than how a </a:t>
+            </a:r>
+            <a:r>
+              <a:rPr lang="en-US" sz="1600" dirty="0">
+                <a:solidFill>
+                  <a:schemeClr val="accent1">
+                    <a:lumMod val="60000"/>
+                    <a:lumOff val="40000"/>
+                  </a:schemeClr>
+                </a:solidFill>
+                <a:latin typeface="Consolas" panose="020B0609020204030204" pitchFamily="49" charset="0"/>
+              </a:rPr>
+              <a:t>Person</a:t>
+            </a:r>
+            <a:r>
+              <a:rPr lang="en-US" dirty="0"/>
+              <a:t> speaks</a:t>
             </a:r>
           </a:p>
         </p:txBody>
@@ -7800,7 +8959,7 @@
     </p:spTree>
     <p:extLst>
       <p:ext uri="{BB962C8B-B14F-4D97-AF65-F5344CB8AC3E}">
-        <p14:creationId xmlns:p14="http://schemas.microsoft.com/office/powerpoint/2010/main" val="2844249970"/>
+        <p14:creationId xmlns:p14="http://schemas.microsoft.com/office/powerpoint/2010/main" val="487672952"/>
       </p:ext>
     </p:extLst>
   </p:cSld>
@@ -7829,10 +8988,10 @@
       </p:grpSpPr>
       <p:sp>
         <p:nvSpPr>
-          <p:cNvPr id="4" name="Title 3">
-            <a:extLst>
-              <a:ext uri="{FF2B5EF4-FFF2-40B4-BE49-F238E27FC236}">
-                <a16:creationId xmlns:a16="http://schemas.microsoft.com/office/drawing/2014/main" id="{68342346-EC0E-4FC5-A7D7-2D236AD7DCDD}"/>
+          <p:cNvPr id="2" name="Title 1">
+            <a:extLst>
+              <a:ext uri="{FF2B5EF4-FFF2-40B4-BE49-F238E27FC236}">
+                <a16:creationId xmlns:a16="http://schemas.microsoft.com/office/drawing/2014/main" id="{FB6580B6-278D-46C5-BAA1-F3294A282DC7}"/>
               </a:ext>
             </a:extLst>
           </p:cNvPr>
@@ -7850,106 +9009,382 @@
           <a:p>
             <a:r>
               <a:rPr lang="en-US" dirty="0"/>
-              <a:t>Shotput, Putt-Putt, Input, </a:t>
-            </a:r>
-            <a:r>
-              <a:rPr lang="en-US" dirty="0" err="1"/>
-              <a:t>Ouput</a:t>
-            </a:r>
-            <a:endParaRPr lang="en-US" dirty="0"/>
+              <a:t>Classes</a:t>
+            </a:r>
           </a:p>
         </p:txBody>
       </p:sp>
-      <p:pic>
-        <p:nvPicPr>
-          <p:cNvPr id="7" name="Content Placeholder 6">
-            <a:extLst>
-              <a:ext uri="{FF2B5EF4-FFF2-40B4-BE49-F238E27FC236}">
-                <a16:creationId xmlns:a16="http://schemas.microsoft.com/office/drawing/2014/main" id="{EBF7F75D-518E-4BE8-8C66-E4F1C19EF33C}"/>
-              </a:ext>
-            </a:extLst>
-          </p:cNvPr>
-          <p:cNvPicPr>
-            <a:picLocks noGrp="1" noChangeAspect="1"/>
-          </p:cNvPicPr>
+      <p:sp>
+        <p:nvSpPr>
+          <p:cNvPr id="3" name="Content Placeholder 2">
+            <a:extLst>
+              <a:ext uri="{FF2B5EF4-FFF2-40B4-BE49-F238E27FC236}">
+                <a16:creationId xmlns:a16="http://schemas.microsoft.com/office/drawing/2014/main" id="{66DD4736-B457-4813-972F-972A6C8D0318}"/>
+              </a:ext>
+            </a:extLst>
+          </p:cNvPr>
+          <p:cNvSpPr>
+            <a:spLocks noGrp="1"/>
+          </p:cNvSpPr>
           <p:nvPr>
             <p:ph idx="1"/>
           </p:nvPr>
-        </p:nvPicPr>
-        <p:blipFill>
-          <a:blip r:embed="rId2">
-            <a:extLst>
-              <a:ext uri="{28A0092B-C50C-407E-A947-70E740481C1C}">
-                <a14:useLocalDpi xmlns:a14="http://schemas.microsoft.com/office/drawing/2010/main" val="0"/>
-              </a:ext>
-              <a:ext uri="{837473B0-CC2E-450A-ABE3-18F120FF3D39}">
-                <a1611:picAttrSrcUrl xmlns:a1611="http://schemas.microsoft.com/office/drawing/2016/11/main" r:id="rId3"/>
-              </a:ext>
-            </a:extLst>
-          </a:blip>
-          <a:stretch>
-            <a:fillRect/>
-          </a:stretch>
-        </p:blipFill>
-        <p:spPr>
-          <a:xfrm>
-            <a:off x="4826000" y="2115344"/>
-            <a:ext cx="2540000" cy="3454400"/>
-          </a:xfrm>
-        </p:spPr>
-      </p:pic>
-      <p:sp>
-        <p:nvSpPr>
-          <p:cNvPr id="8" name="TextBox 7">
-            <a:extLst>
-              <a:ext uri="{FF2B5EF4-FFF2-40B4-BE49-F238E27FC236}">
-                <a16:creationId xmlns:a16="http://schemas.microsoft.com/office/drawing/2014/main" id="{702174B2-32B2-4E0A-BBB9-6526459CEEA3}"/>
-              </a:ext>
-            </a:extLst>
-          </p:cNvPr>
-          <p:cNvSpPr txBox="1"/>
-          <p:nvPr/>
         </p:nvSpPr>
         <p:spPr>
           <a:xfrm>
-            <a:off x="4826000" y="5569744"/>
-            <a:ext cx="2540000" cy="369332"/>
+            <a:off x="838200" y="1507786"/>
+            <a:ext cx="10515600" cy="5134553"/>
           </a:xfrm>
-          <a:prstGeom prst="rect">
-            <a:avLst/>
-          </a:prstGeom>
-          <a:noFill/>
         </p:spPr>
         <p:txBody>
-          <a:bodyPr wrap="square" rtlCol="0">
-            <a:spAutoFit/>
-          </a:bodyPr>
+          <a:bodyPr/>
           <a:lstStyle/>
           <a:p>
             <a:r>
-              <a:rPr lang="en-US" sz="900">
-                <a:hlinkClick r:id="rId3" tooltip="https://en.wikipedia.org/wiki/One_Fish_Two_Fish_Red_Fish_Blue_Fish"/>
+              <a:rPr lang="en-US" dirty="0"/>
+              <a:t>Advanced classes can have (cont’d):</a:t>
+            </a:r>
+          </a:p>
+          <a:p>
+            <a:pPr lvl="1"/>
+            <a:r>
+              <a:rPr lang="en-US" dirty="0"/>
+              <a:t>Overloaded Methods/Constructors</a:t>
+            </a:r>
+          </a:p>
+          <a:p>
+            <a:pPr lvl="2"/>
+            <a:r>
+              <a:rPr lang="en-US" dirty="0"/>
+              <a:t>A </a:t>
+            </a:r>
+            <a:r>
+              <a:rPr lang="en-US" sz="1800" dirty="0">
+                <a:solidFill>
+                  <a:schemeClr val="accent1">
+                    <a:lumMod val="60000"/>
+                    <a:lumOff val="40000"/>
+                  </a:schemeClr>
+                </a:solidFill>
+                <a:latin typeface="Consolas" panose="020B0609020204030204" pitchFamily="49" charset="0"/>
               </a:rPr>
-              <a:t>This Photo</a:t>
-            </a:r>
-            <a:r>
-              <a:rPr lang="en-US" sz="900"/>
-              <a:t> by Unknown Author is licensed under </a:t>
-            </a:r>
-            <a:r>
-              <a:rPr lang="en-US" sz="900">
-                <a:hlinkClick r:id="rId4" tooltip="https://creativecommons.org/licenses/by-sa/3.0/"/>
+              <a:t>Person</a:t>
+            </a:r>
+            <a:r>
+              <a:rPr lang="en-US" dirty="0"/>
+              <a:t> can have their </a:t>
+            </a:r>
+            <a:r>
+              <a:rPr lang="en-US" sz="1800" dirty="0">
+                <a:solidFill>
+                  <a:schemeClr val="accent1">
+                    <a:lumMod val="60000"/>
+                    <a:lumOff val="40000"/>
+                  </a:schemeClr>
+                </a:solidFill>
+                <a:latin typeface="Consolas" panose="020B0609020204030204" pitchFamily="49" charset="0"/>
               </a:rPr>
-              <a:t>CC BY-SA</a:t>
-            </a:r>
-            <a:endParaRPr lang="en-US" sz="900"/>
+              <a:t>Birthday</a:t>
+            </a:r>
+            <a:r>
+              <a:rPr lang="en-US" dirty="0"/>
+              <a:t> set at birth</a:t>
+            </a:r>
+          </a:p>
+          <a:p>
+            <a:pPr lvl="2"/>
+            <a:r>
+              <a:rPr lang="en-US" dirty="0"/>
+              <a:t>A </a:t>
+            </a:r>
+            <a:r>
+              <a:rPr lang="en-US" sz="1800" dirty="0">
+                <a:solidFill>
+                  <a:schemeClr val="accent1">
+                    <a:lumMod val="60000"/>
+                    <a:lumOff val="40000"/>
+                  </a:schemeClr>
+                </a:solidFill>
+                <a:latin typeface="Consolas" panose="020B0609020204030204" pitchFamily="49" charset="0"/>
+              </a:rPr>
+              <a:t>Person</a:t>
+            </a:r>
+            <a:r>
+              <a:rPr lang="en-US" dirty="0"/>
+              <a:t> can have their </a:t>
+            </a:r>
+            <a:r>
+              <a:rPr lang="en-US" sz="1800" dirty="0">
+                <a:solidFill>
+                  <a:schemeClr val="accent1">
+                    <a:lumMod val="60000"/>
+                    <a:lumOff val="40000"/>
+                  </a:schemeClr>
+                </a:solidFill>
+                <a:latin typeface="Consolas" panose="020B0609020204030204" pitchFamily="49" charset="0"/>
+              </a:rPr>
+              <a:t>Name</a:t>
+            </a:r>
+            <a:r>
+              <a:rPr lang="en-US" dirty="0"/>
+              <a:t> and </a:t>
+            </a:r>
+            <a:r>
+              <a:rPr lang="en-US" sz="1800" dirty="0">
+                <a:solidFill>
+                  <a:schemeClr val="accent1">
+                    <a:lumMod val="60000"/>
+                    <a:lumOff val="40000"/>
+                  </a:schemeClr>
+                </a:solidFill>
+                <a:latin typeface="Consolas" panose="020B0609020204030204" pitchFamily="49" charset="0"/>
+              </a:rPr>
+              <a:t>Birthday</a:t>
+            </a:r>
+            <a:r>
+              <a:rPr lang="en-US" dirty="0"/>
+              <a:t> set at birth</a:t>
+            </a:r>
+          </a:p>
+          <a:p>
+            <a:pPr lvl="2"/>
+            <a:r>
+              <a:rPr lang="en-US" dirty="0"/>
+              <a:t>A </a:t>
+            </a:r>
+            <a:r>
+              <a:rPr lang="en-US" sz="1800" dirty="0">
+                <a:solidFill>
+                  <a:schemeClr val="accent1">
+                    <a:lumMod val="60000"/>
+                    <a:lumOff val="40000"/>
+                  </a:schemeClr>
+                </a:solidFill>
+                <a:latin typeface="Consolas" panose="020B0609020204030204" pitchFamily="49" charset="0"/>
+              </a:rPr>
+              <a:t>Person</a:t>
+            </a:r>
+            <a:r>
+              <a:rPr lang="en-US" dirty="0"/>
+              <a:t> can have their </a:t>
+            </a:r>
+            <a:r>
+              <a:rPr lang="en-US" sz="1800" dirty="0">
+                <a:solidFill>
+                  <a:schemeClr val="accent1">
+                    <a:lumMod val="60000"/>
+                    <a:lumOff val="40000"/>
+                  </a:schemeClr>
+                </a:solidFill>
+                <a:latin typeface="Consolas" panose="020B0609020204030204" pitchFamily="49" charset="0"/>
+              </a:rPr>
+              <a:t>Name</a:t>
+            </a:r>
+            <a:r>
+              <a:rPr lang="en-US" dirty="0"/>
+              <a:t>, </a:t>
+            </a:r>
+            <a:r>
+              <a:rPr lang="en-US" sz="1800" dirty="0">
+                <a:solidFill>
+                  <a:schemeClr val="accent1">
+                    <a:lumMod val="60000"/>
+                    <a:lumOff val="40000"/>
+                  </a:schemeClr>
+                </a:solidFill>
+                <a:latin typeface="Consolas" panose="020B0609020204030204" pitchFamily="49" charset="0"/>
+              </a:rPr>
+              <a:t>Birthday</a:t>
+            </a:r>
+            <a:r>
+              <a:rPr lang="en-US" dirty="0"/>
+              <a:t>, and </a:t>
+            </a:r>
+            <a:r>
+              <a:rPr lang="en-US" sz="1800" dirty="0">
+                <a:solidFill>
+                  <a:schemeClr val="accent1">
+                    <a:lumMod val="60000"/>
+                    <a:lumOff val="40000"/>
+                  </a:schemeClr>
+                </a:solidFill>
+                <a:latin typeface="Consolas" panose="020B0609020204030204" pitchFamily="49" charset="0"/>
+              </a:rPr>
+              <a:t>Current</a:t>
+            </a:r>
+            <a:r>
+              <a:rPr lang="en-US" dirty="0"/>
+              <a:t> </a:t>
+            </a:r>
+            <a:r>
+              <a:rPr lang="en-US" sz="1800" dirty="0">
+                <a:solidFill>
+                  <a:schemeClr val="accent1">
+                    <a:lumMod val="60000"/>
+                    <a:lumOff val="40000"/>
+                  </a:schemeClr>
+                </a:solidFill>
+                <a:latin typeface="Consolas" panose="020B0609020204030204" pitchFamily="49" charset="0"/>
+              </a:rPr>
+              <a:t>Location</a:t>
+            </a:r>
+            <a:r>
+              <a:rPr lang="en-US" dirty="0"/>
+              <a:t> set at birth</a:t>
+            </a:r>
+          </a:p>
+          <a:p>
+            <a:pPr lvl="1"/>
+            <a:r>
+              <a:rPr lang="en-US" dirty="0"/>
+              <a:t>Overridden Methods</a:t>
+            </a:r>
+          </a:p>
+          <a:p>
+            <a:pPr lvl="2"/>
+            <a:r>
+              <a:rPr lang="en-US" dirty="0"/>
+              <a:t>An </a:t>
+            </a:r>
+            <a:r>
+              <a:rPr lang="en-US" sz="1800" dirty="0">
+                <a:solidFill>
+                  <a:schemeClr val="accent1">
+                    <a:lumMod val="60000"/>
+                    <a:lumOff val="40000"/>
+                  </a:schemeClr>
+                </a:solidFill>
+                <a:latin typeface="Consolas" panose="020B0609020204030204" pitchFamily="49" charset="0"/>
+              </a:rPr>
+              <a:t>Infant</a:t>
+            </a:r>
+            <a:r>
+              <a:rPr lang="en-US" dirty="0"/>
+              <a:t> is a </a:t>
+            </a:r>
+            <a:r>
+              <a:rPr lang="en-US" sz="1800" dirty="0">
+                <a:solidFill>
+                  <a:schemeClr val="accent1">
+                    <a:lumMod val="60000"/>
+                    <a:lumOff val="40000"/>
+                  </a:schemeClr>
+                </a:solidFill>
+                <a:latin typeface="Consolas" panose="020B0609020204030204" pitchFamily="49" charset="0"/>
+              </a:rPr>
+              <a:t>Person</a:t>
+            </a:r>
+            <a:r>
+              <a:rPr lang="en-US" dirty="0"/>
+              <a:t> but cannot </a:t>
+            </a:r>
+            <a:r>
+              <a:rPr lang="en-US" sz="1800" dirty="0">
+                <a:solidFill>
+                  <a:schemeClr val="accent1">
+                    <a:lumMod val="60000"/>
+                    <a:lumOff val="40000"/>
+                  </a:schemeClr>
+                </a:solidFill>
+                <a:latin typeface="Consolas" panose="020B0609020204030204" pitchFamily="49" charset="0"/>
+              </a:rPr>
+              <a:t>Say</a:t>
+            </a:r>
+            <a:r>
+              <a:rPr lang="en-US" sz="1800" dirty="0">
+                <a:solidFill>
+                  <a:schemeClr val="accent1">
+                    <a:lumMod val="60000"/>
+                    <a:lumOff val="40000"/>
+                  </a:schemeClr>
+                </a:solidFill>
+              </a:rPr>
+              <a:t> </a:t>
+            </a:r>
+            <a:r>
+              <a:rPr lang="en-US" sz="1800" dirty="0">
+                <a:solidFill>
+                  <a:schemeClr val="accent1">
+                    <a:lumMod val="60000"/>
+                    <a:lumOff val="40000"/>
+                  </a:schemeClr>
+                </a:solidFill>
+                <a:latin typeface="Consolas" panose="020B0609020204030204" pitchFamily="49" charset="0"/>
+              </a:rPr>
+              <a:t>Name</a:t>
+            </a:r>
+            <a:r>
+              <a:rPr lang="en-US" dirty="0">
+                <a:solidFill>
+                  <a:schemeClr val="accent1">
+                    <a:lumMod val="60000"/>
+                    <a:lumOff val="40000"/>
+                  </a:schemeClr>
+                </a:solidFill>
+              </a:rPr>
+              <a:t> </a:t>
+            </a:r>
+            <a:r>
+              <a:rPr lang="en-US" dirty="0"/>
+              <a:t>(at least not very well)</a:t>
+            </a:r>
+          </a:p>
+          <a:p>
+            <a:pPr lvl="1"/>
+            <a:r>
+              <a:rPr lang="en-US" dirty="0"/>
+              <a:t>Validation Attributes</a:t>
+            </a:r>
+          </a:p>
+          <a:p>
+            <a:pPr lvl="2"/>
+            <a:r>
+              <a:rPr lang="en-US" dirty="0"/>
+              <a:t>A </a:t>
+            </a:r>
+            <a:r>
+              <a:rPr lang="en-US" sz="1800" dirty="0">
+                <a:solidFill>
+                  <a:schemeClr val="accent1">
+                    <a:lumMod val="60000"/>
+                    <a:lumOff val="40000"/>
+                  </a:schemeClr>
+                </a:solidFill>
+                <a:latin typeface="Consolas" panose="020B0609020204030204" pitchFamily="49" charset="0"/>
+              </a:rPr>
+              <a:t>Person</a:t>
+            </a:r>
+            <a:r>
+              <a:rPr lang="en-US" dirty="0"/>
+              <a:t> must have an </a:t>
+            </a:r>
+            <a:r>
+              <a:rPr lang="en-US" sz="1800" dirty="0">
+                <a:solidFill>
+                  <a:schemeClr val="accent1">
+                    <a:lumMod val="60000"/>
+                    <a:lumOff val="40000"/>
+                  </a:schemeClr>
+                </a:solidFill>
+                <a:latin typeface="Consolas" panose="020B0609020204030204" pitchFamily="49" charset="0"/>
+              </a:rPr>
+              <a:t>age</a:t>
+            </a:r>
+            <a:r>
+              <a:rPr lang="en-US" dirty="0"/>
+              <a:t> </a:t>
+            </a:r>
+            <a:r>
+              <a:rPr lang="en-US" i="1" dirty="0"/>
+              <a:t>greater than 0</a:t>
+            </a:r>
           </a:p>
         </p:txBody>
       </p:sp>
     </p:spTree>
     <p:extLst>
       <p:ext uri="{BB962C8B-B14F-4D97-AF65-F5344CB8AC3E}">
-        <p14:creationId xmlns:p14="http://schemas.microsoft.com/office/powerpoint/2010/main" val="1409399340"/>
+        <p14:creationId xmlns:p14="http://schemas.microsoft.com/office/powerpoint/2010/main" val="2199910864"/>
       </p:ext>
     </p:extLst>
   </p:cSld>

</xml_diff>